<commit_message>
Added new slides to abbreviated slides
</commit_message>
<xml_diff>
--- a/courses/ase/lectures/Ch12 Safety Engineering-abbreviated.pptx
+++ b/courses/ase/lectures/Ch12 Safety Engineering-abbreviated.pptx
@@ -4,25 +4,31 @@
   <p:sldMasterIdLst>
     <p:sldMasterId id="2147483648" r:id="rId1"/>
   </p:sldMasterIdLst>
+  <p:notesMasterIdLst>
+    <p:notesMasterId r:id="rId23"/>
+  </p:notesMasterIdLst>
   <p:sldIdLst>
     <p:sldId id="258" r:id="rId2"/>
-    <p:sldId id="272" r:id="rId3"/>
-    <p:sldId id="311" r:id="rId4"/>
-    <p:sldId id="273" r:id="rId5"/>
-    <p:sldId id="274" r:id="rId6"/>
-    <p:sldId id="275" r:id="rId7"/>
-    <p:sldId id="276" r:id="rId8"/>
-    <p:sldId id="277" r:id="rId9"/>
-    <p:sldId id="278" r:id="rId10"/>
-    <p:sldId id="279" r:id="rId11"/>
-    <p:sldId id="280" r:id="rId12"/>
-    <p:sldId id="281" r:id="rId13"/>
-    <p:sldId id="282" r:id="rId14"/>
-    <p:sldId id="283" r:id="rId15"/>
-    <p:sldId id="284" r:id="rId16"/>
-    <p:sldId id="285" r:id="rId17"/>
-    <p:sldId id="286" r:id="rId18"/>
-    <p:sldId id="287" r:id="rId19"/>
+    <p:sldId id="264" r:id="rId3"/>
+    <p:sldId id="306" r:id="rId4"/>
+    <p:sldId id="307" r:id="rId5"/>
+    <p:sldId id="272" r:id="rId6"/>
+    <p:sldId id="311" r:id="rId7"/>
+    <p:sldId id="273" r:id="rId8"/>
+    <p:sldId id="274" r:id="rId9"/>
+    <p:sldId id="275" r:id="rId10"/>
+    <p:sldId id="276" r:id="rId11"/>
+    <p:sldId id="277" r:id="rId12"/>
+    <p:sldId id="278" r:id="rId13"/>
+    <p:sldId id="279" r:id="rId14"/>
+    <p:sldId id="280" r:id="rId15"/>
+    <p:sldId id="281" r:id="rId16"/>
+    <p:sldId id="282" r:id="rId17"/>
+    <p:sldId id="283" r:id="rId18"/>
+    <p:sldId id="284" r:id="rId19"/>
+    <p:sldId id="285" r:id="rId20"/>
+    <p:sldId id="286" r:id="rId21"/>
+    <p:sldId id="287" r:id="rId22"/>
   </p:sldIdLst>
   <p:sldSz cx="12192000" cy="6858000"/>
   <p:notesSz cx="6858000" cy="9144000"/>
@@ -121,7 +127,497 @@
       </a:defRPr>
     </a:lvl9pPr>
   </p:defaultTextStyle>
+  <p:extLst>
+    <p:ext uri="{EFAFB233-063F-42B5-8137-9DF3F51BA10A}">
+      <p15:sldGuideLst xmlns:p15="http://schemas.microsoft.com/office/powerpoint/2012/main"/>
+    </p:ext>
+  </p:extLst>
 </p:presentation>
+</file>
+
+<file path=ppt/notesMasters/notesMaster1.xml><?xml version="1.0" encoding="utf-8"?>
+<p:notesMaster xmlns:a="http://schemas.openxmlformats.org/drawingml/2006/main" xmlns:r="http://schemas.openxmlformats.org/officeDocument/2006/relationships" xmlns:p="http://schemas.openxmlformats.org/presentationml/2006/main">
+  <p:cSld>
+    <p:bg>
+      <p:bgRef idx="1001">
+        <a:schemeClr val="bg1"/>
+      </p:bgRef>
+    </p:bg>
+    <p:spTree>
+      <p:nvGrpSpPr>
+        <p:cNvPr id="1" name=""/>
+        <p:cNvGrpSpPr/>
+        <p:nvPr/>
+      </p:nvGrpSpPr>
+      <p:grpSpPr>
+        <a:xfrm>
+          <a:off x="0" y="0"/>
+          <a:ext cx="0" cy="0"/>
+          <a:chOff x="0" y="0"/>
+          <a:chExt cx="0" cy="0"/>
+        </a:xfrm>
+      </p:grpSpPr>
+      <p:sp>
+        <p:nvSpPr>
+          <p:cNvPr id="2" name="Header Placeholder 1"/>
+          <p:cNvSpPr>
+            <a:spLocks noGrp="1"/>
+          </p:cNvSpPr>
+          <p:nvPr>
+            <p:ph type="hdr" sz="quarter"/>
+          </p:nvPr>
+        </p:nvSpPr>
+        <p:spPr>
+          <a:xfrm>
+            <a:off x="0" y="0"/>
+            <a:ext cx="2971800" cy="458788"/>
+          </a:xfrm>
+          <a:prstGeom prst="rect">
+            <a:avLst/>
+          </a:prstGeom>
+        </p:spPr>
+        <p:txBody>
+          <a:bodyPr vert="horz" lIns="91440" tIns="45720" rIns="91440" bIns="45720" rtlCol="0"/>
+          <a:lstStyle>
+            <a:lvl1pPr algn="l">
+              <a:defRPr sz="1200"/>
+            </a:lvl1pPr>
+          </a:lstStyle>
+          <a:p>
+            <a:endParaRPr lang="en-US"/>
+          </a:p>
+        </p:txBody>
+      </p:sp>
+      <p:sp>
+        <p:nvSpPr>
+          <p:cNvPr id="3" name="Date Placeholder 2"/>
+          <p:cNvSpPr>
+            <a:spLocks noGrp="1"/>
+          </p:cNvSpPr>
+          <p:nvPr>
+            <p:ph type="dt" idx="1"/>
+          </p:nvPr>
+        </p:nvSpPr>
+        <p:spPr>
+          <a:xfrm>
+            <a:off x="3884613" y="0"/>
+            <a:ext cx="2971800" cy="458788"/>
+          </a:xfrm>
+          <a:prstGeom prst="rect">
+            <a:avLst/>
+          </a:prstGeom>
+        </p:spPr>
+        <p:txBody>
+          <a:bodyPr vert="horz" lIns="91440" tIns="45720" rIns="91440" bIns="45720" rtlCol="0"/>
+          <a:lstStyle>
+            <a:lvl1pPr algn="r">
+              <a:defRPr sz="1200"/>
+            </a:lvl1pPr>
+          </a:lstStyle>
+          <a:p>
+            <a:fld id="{E20EDD1A-6F2C-C244-8AED-CEB582D40F30}" type="datetimeFigureOut">
+              <a:rPr lang="en-US" smtClean="0"/>
+              <a:t>2/16/21</a:t>
+            </a:fld>
+            <a:endParaRPr lang="en-US"/>
+          </a:p>
+        </p:txBody>
+      </p:sp>
+      <p:sp>
+        <p:nvSpPr>
+          <p:cNvPr id="4" name="Slide Image Placeholder 3"/>
+          <p:cNvSpPr>
+            <a:spLocks noGrp="1" noRot="1" noChangeAspect="1"/>
+          </p:cNvSpPr>
+          <p:nvPr>
+            <p:ph type="sldImg" idx="2"/>
+          </p:nvPr>
+        </p:nvSpPr>
+        <p:spPr>
+          <a:xfrm>
+            <a:off x="685800" y="1143000"/>
+            <a:ext cx="5486400" cy="3086100"/>
+          </a:xfrm>
+          <a:prstGeom prst="rect">
+            <a:avLst/>
+          </a:prstGeom>
+          <a:noFill/>
+          <a:ln w="12700">
+            <a:solidFill>
+              <a:prstClr val="black"/>
+            </a:solidFill>
+          </a:ln>
+        </p:spPr>
+        <p:txBody>
+          <a:bodyPr vert="horz" lIns="91440" tIns="45720" rIns="91440" bIns="45720" rtlCol="0" anchor="ctr"/>
+          <a:lstStyle/>
+          <a:p>
+            <a:endParaRPr lang="en-US"/>
+          </a:p>
+        </p:txBody>
+      </p:sp>
+      <p:sp>
+        <p:nvSpPr>
+          <p:cNvPr id="5" name="Notes Placeholder 4"/>
+          <p:cNvSpPr>
+            <a:spLocks noGrp="1"/>
+          </p:cNvSpPr>
+          <p:nvPr>
+            <p:ph type="body" sz="quarter" idx="3"/>
+          </p:nvPr>
+        </p:nvSpPr>
+        <p:spPr>
+          <a:xfrm>
+            <a:off x="685800" y="4400550"/>
+            <a:ext cx="5486400" cy="3600450"/>
+          </a:xfrm>
+          <a:prstGeom prst="rect">
+            <a:avLst/>
+          </a:prstGeom>
+        </p:spPr>
+        <p:txBody>
+          <a:bodyPr vert="horz" lIns="91440" tIns="45720" rIns="91440" bIns="45720" rtlCol="0"/>
+          <a:lstStyle/>
+          <a:p>
+            <a:pPr lvl="0"/>
+            <a:r>
+              <a:rPr lang="en-US"/>
+              <a:t>Click to edit Master text styles</a:t>
+            </a:r>
+          </a:p>
+          <a:p>
+            <a:pPr lvl="1"/>
+            <a:r>
+              <a:rPr lang="en-US"/>
+              <a:t>Second level</a:t>
+            </a:r>
+          </a:p>
+          <a:p>
+            <a:pPr lvl="2"/>
+            <a:r>
+              <a:rPr lang="en-US"/>
+              <a:t>Third level</a:t>
+            </a:r>
+          </a:p>
+          <a:p>
+            <a:pPr lvl="3"/>
+            <a:r>
+              <a:rPr lang="en-US"/>
+              <a:t>Fourth level</a:t>
+            </a:r>
+          </a:p>
+          <a:p>
+            <a:pPr lvl="4"/>
+            <a:r>
+              <a:rPr lang="en-US"/>
+              <a:t>Fifth level</a:t>
+            </a:r>
+          </a:p>
+        </p:txBody>
+      </p:sp>
+      <p:sp>
+        <p:nvSpPr>
+          <p:cNvPr id="6" name="Footer Placeholder 5"/>
+          <p:cNvSpPr>
+            <a:spLocks noGrp="1"/>
+          </p:cNvSpPr>
+          <p:nvPr>
+            <p:ph type="ftr" sz="quarter" idx="4"/>
+          </p:nvPr>
+        </p:nvSpPr>
+        <p:spPr>
+          <a:xfrm>
+            <a:off x="0" y="8685213"/>
+            <a:ext cx="2971800" cy="458787"/>
+          </a:xfrm>
+          <a:prstGeom prst="rect">
+            <a:avLst/>
+          </a:prstGeom>
+        </p:spPr>
+        <p:txBody>
+          <a:bodyPr vert="horz" lIns="91440" tIns="45720" rIns="91440" bIns="45720" rtlCol="0" anchor="b"/>
+          <a:lstStyle>
+            <a:lvl1pPr algn="l">
+              <a:defRPr sz="1200"/>
+            </a:lvl1pPr>
+          </a:lstStyle>
+          <a:p>
+            <a:endParaRPr lang="en-US"/>
+          </a:p>
+        </p:txBody>
+      </p:sp>
+      <p:sp>
+        <p:nvSpPr>
+          <p:cNvPr id="7" name="Slide Number Placeholder 6"/>
+          <p:cNvSpPr>
+            <a:spLocks noGrp="1"/>
+          </p:cNvSpPr>
+          <p:nvPr>
+            <p:ph type="sldNum" sz="quarter" idx="5"/>
+          </p:nvPr>
+        </p:nvSpPr>
+        <p:spPr>
+          <a:xfrm>
+            <a:off x="3884613" y="8685213"/>
+            <a:ext cx="2971800" cy="458787"/>
+          </a:xfrm>
+          <a:prstGeom prst="rect">
+            <a:avLst/>
+          </a:prstGeom>
+        </p:spPr>
+        <p:txBody>
+          <a:bodyPr vert="horz" lIns="91440" tIns="45720" rIns="91440" bIns="45720" rtlCol="0" anchor="b"/>
+          <a:lstStyle>
+            <a:lvl1pPr algn="r">
+              <a:defRPr sz="1200"/>
+            </a:lvl1pPr>
+          </a:lstStyle>
+          <a:p>
+            <a:fld id="{5A54B31C-601B-EF41-83CE-CD387CBBE4BD}" type="slidenum">
+              <a:rPr lang="en-US" smtClean="0"/>
+              <a:t>‹#›</a:t>
+            </a:fld>
+            <a:endParaRPr lang="en-US"/>
+          </a:p>
+        </p:txBody>
+      </p:sp>
+    </p:spTree>
+    <p:extLst>
+      <p:ext uri="{BB962C8B-B14F-4D97-AF65-F5344CB8AC3E}">
+        <p14:creationId xmlns:p14="http://schemas.microsoft.com/office/powerpoint/2010/main" val="2364461550"/>
+      </p:ext>
+    </p:extLst>
+  </p:cSld>
+  <p:clrMap bg1="lt1" tx1="dk1" bg2="lt2" tx2="dk2" accent1="accent1" accent2="accent2" accent3="accent3" accent4="accent4" accent5="accent5" accent6="accent6" hlink="hlink" folHlink="folHlink"/>
+  <p:notesStyle>
+    <a:lvl1pPr marL="0" algn="l" defTabSz="914400" rtl="0" eaLnBrk="1" latinLnBrk="0" hangingPunct="1">
+      <a:defRPr sz="1200" kern="1200">
+        <a:solidFill>
+          <a:schemeClr val="tx1"/>
+        </a:solidFill>
+        <a:latin typeface="+mn-lt"/>
+        <a:ea typeface="+mn-ea"/>
+        <a:cs typeface="+mn-cs"/>
+      </a:defRPr>
+    </a:lvl1pPr>
+    <a:lvl2pPr marL="457200" algn="l" defTabSz="914400" rtl="0" eaLnBrk="1" latinLnBrk="0" hangingPunct="1">
+      <a:defRPr sz="1200" kern="1200">
+        <a:solidFill>
+          <a:schemeClr val="tx1"/>
+        </a:solidFill>
+        <a:latin typeface="+mn-lt"/>
+        <a:ea typeface="+mn-ea"/>
+        <a:cs typeface="+mn-cs"/>
+      </a:defRPr>
+    </a:lvl2pPr>
+    <a:lvl3pPr marL="914400" algn="l" defTabSz="914400" rtl="0" eaLnBrk="1" latinLnBrk="0" hangingPunct="1">
+      <a:defRPr sz="1200" kern="1200">
+        <a:solidFill>
+          <a:schemeClr val="tx1"/>
+        </a:solidFill>
+        <a:latin typeface="+mn-lt"/>
+        <a:ea typeface="+mn-ea"/>
+        <a:cs typeface="+mn-cs"/>
+      </a:defRPr>
+    </a:lvl3pPr>
+    <a:lvl4pPr marL="1371600" algn="l" defTabSz="914400" rtl="0" eaLnBrk="1" latinLnBrk="0" hangingPunct="1">
+      <a:defRPr sz="1200" kern="1200">
+        <a:solidFill>
+          <a:schemeClr val="tx1"/>
+        </a:solidFill>
+        <a:latin typeface="+mn-lt"/>
+        <a:ea typeface="+mn-ea"/>
+        <a:cs typeface="+mn-cs"/>
+      </a:defRPr>
+    </a:lvl4pPr>
+    <a:lvl5pPr marL="1828800" algn="l" defTabSz="914400" rtl="0" eaLnBrk="1" latinLnBrk="0" hangingPunct="1">
+      <a:defRPr sz="1200" kern="1200">
+        <a:solidFill>
+          <a:schemeClr val="tx1"/>
+        </a:solidFill>
+        <a:latin typeface="+mn-lt"/>
+        <a:ea typeface="+mn-ea"/>
+        <a:cs typeface="+mn-cs"/>
+      </a:defRPr>
+    </a:lvl5pPr>
+    <a:lvl6pPr marL="2286000" algn="l" defTabSz="914400" rtl="0" eaLnBrk="1" latinLnBrk="0" hangingPunct="1">
+      <a:defRPr sz="1200" kern="1200">
+        <a:solidFill>
+          <a:schemeClr val="tx1"/>
+        </a:solidFill>
+        <a:latin typeface="+mn-lt"/>
+        <a:ea typeface="+mn-ea"/>
+        <a:cs typeface="+mn-cs"/>
+      </a:defRPr>
+    </a:lvl6pPr>
+    <a:lvl7pPr marL="2743200" algn="l" defTabSz="914400" rtl="0" eaLnBrk="1" latinLnBrk="0" hangingPunct="1">
+      <a:defRPr sz="1200" kern="1200">
+        <a:solidFill>
+          <a:schemeClr val="tx1"/>
+        </a:solidFill>
+        <a:latin typeface="+mn-lt"/>
+        <a:ea typeface="+mn-ea"/>
+        <a:cs typeface="+mn-cs"/>
+      </a:defRPr>
+    </a:lvl7pPr>
+    <a:lvl8pPr marL="3200400" algn="l" defTabSz="914400" rtl="0" eaLnBrk="1" latinLnBrk="0" hangingPunct="1">
+      <a:defRPr sz="1200" kern="1200">
+        <a:solidFill>
+          <a:schemeClr val="tx1"/>
+        </a:solidFill>
+        <a:latin typeface="+mn-lt"/>
+        <a:ea typeface="+mn-ea"/>
+        <a:cs typeface="+mn-cs"/>
+      </a:defRPr>
+    </a:lvl8pPr>
+    <a:lvl9pPr marL="3657600" algn="l" defTabSz="914400" rtl="0" eaLnBrk="1" latinLnBrk="0" hangingPunct="1">
+      <a:defRPr sz="1200" kern="1200">
+        <a:solidFill>
+          <a:schemeClr val="tx1"/>
+        </a:solidFill>
+        <a:latin typeface="+mn-lt"/>
+        <a:ea typeface="+mn-ea"/>
+        <a:cs typeface="+mn-cs"/>
+      </a:defRPr>
+    </a:lvl9pPr>
+  </p:notesStyle>
+</p:notesMaster>
+</file>
+
+<file path=ppt/notesSlides/notesSlide1.xml><?xml version="1.0" encoding="utf-8"?>
+<p:notes xmlns:a="http://schemas.openxmlformats.org/drawingml/2006/main" xmlns:r="http://schemas.openxmlformats.org/officeDocument/2006/relationships" xmlns:p="http://schemas.openxmlformats.org/presentationml/2006/main">
+  <p:cSld>
+    <p:spTree>
+      <p:nvGrpSpPr>
+        <p:cNvPr id="1" name=""/>
+        <p:cNvGrpSpPr/>
+        <p:nvPr/>
+      </p:nvGrpSpPr>
+      <p:grpSpPr>
+        <a:xfrm>
+          <a:off x="0" y="0"/>
+          <a:ext cx="0" cy="0"/>
+          <a:chOff x="0" y="0"/>
+          <a:chExt cx="0" cy="0"/>
+        </a:xfrm>
+      </p:grpSpPr>
+      <p:sp>
+        <p:nvSpPr>
+          <p:cNvPr id="54274" name="Rectangle 2"/>
+          <p:cNvSpPr>
+            <a:spLocks noGrp="1" noRot="1" noChangeAspect="1" noChangeArrowheads="1" noTextEdit="1"/>
+          </p:cNvSpPr>
+          <p:nvPr>
+            <p:ph type="sldImg"/>
+          </p:nvPr>
+        </p:nvSpPr>
+        <p:spPr>
+          <a:ln/>
+        </p:spPr>
+      </p:sp>
+      <p:sp>
+        <p:nvSpPr>
+          <p:cNvPr id="54275" name="Rectangle 3"/>
+          <p:cNvSpPr>
+            <a:spLocks noGrp="1" noChangeArrowheads="1"/>
+          </p:cNvSpPr>
+          <p:nvPr>
+            <p:ph type="body" idx="1"/>
+          </p:nvPr>
+        </p:nvSpPr>
+        <p:spPr/>
+        <p:txBody>
+          <a:bodyPr/>
+          <a:lstStyle/>
+          <a:p>
+            <a:endParaRPr lang="en-US"/>
+          </a:p>
+        </p:txBody>
+      </p:sp>
+    </p:spTree>
+    <p:extLst>
+      <p:ext uri="{BB962C8B-B14F-4D97-AF65-F5344CB8AC3E}">
+        <p14:creationId xmlns:p14="http://schemas.microsoft.com/office/powerpoint/2010/main" val="4240195585"/>
+      </p:ext>
+    </p:extLst>
+  </p:cSld>
+  <p:clrMapOvr>
+    <a:masterClrMapping/>
+  </p:clrMapOvr>
+</p:notes>
+</file>
+
+<file path=ppt/notesSlides/notesSlide2.xml><?xml version="1.0" encoding="utf-8"?>
+<p:notes xmlns:a="http://schemas.openxmlformats.org/drawingml/2006/main" xmlns:r="http://schemas.openxmlformats.org/officeDocument/2006/relationships" xmlns:p="http://schemas.openxmlformats.org/presentationml/2006/main">
+  <p:cSld>
+    <p:spTree>
+      <p:nvGrpSpPr>
+        <p:cNvPr id="1" name=""/>
+        <p:cNvGrpSpPr/>
+        <p:nvPr/>
+      </p:nvGrpSpPr>
+      <p:grpSpPr>
+        <a:xfrm>
+          <a:off x="0" y="0"/>
+          <a:ext cx="0" cy="0"/>
+          <a:chOff x="0" y="0"/>
+          <a:chExt cx="0" cy="0"/>
+        </a:xfrm>
+      </p:grpSpPr>
+      <p:sp>
+        <p:nvSpPr>
+          <p:cNvPr id="23554" name="Rectangle 2"/>
+          <p:cNvSpPr>
+            <a:spLocks noGrp="1" noChangeArrowheads="1"/>
+          </p:cNvSpPr>
+          <p:nvPr>
+            <p:ph type="body" idx="1"/>
+          </p:nvPr>
+        </p:nvSpPr>
+        <p:spPr>
+          <a:xfrm>
+            <a:off x="914619" y="4346369"/>
+            <a:ext cx="5028763" cy="3852059"/>
+          </a:xfrm>
+          <a:ln/>
+        </p:spPr>
+        <p:txBody>
+          <a:bodyPr/>
+          <a:lstStyle/>
+          <a:p>
+            <a:endParaRPr lang="en-US"/>
+          </a:p>
+        </p:txBody>
+      </p:sp>
+      <p:sp>
+        <p:nvSpPr>
+          <p:cNvPr id="23555" name="Rectangle 3"/>
+          <p:cNvSpPr>
+            <a:spLocks noGrp="1" noRot="1" noChangeAspect="1" noChangeArrowheads="1" noTextEdit="1"/>
+          </p:cNvSpPr>
+          <p:nvPr>
+            <p:ph type="sldImg"/>
+          </p:nvPr>
+        </p:nvSpPr>
+        <p:spPr>
+          <a:xfrm>
+            <a:off x="1287463" y="793750"/>
+            <a:ext cx="4283075" cy="3211513"/>
+          </a:xfrm>
+          <a:ln cap="flat"/>
+        </p:spPr>
+      </p:sp>
+    </p:spTree>
+    <p:extLst>
+      <p:ext uri="{BB962C8B-B14F-4D97-AF65-F5344CB8AC3E}">
+        <p14:creationId xmlns:p14="http://schemas.microsoft.com/office/powerpoint/2010/main" val="3841739772"/>
+      </p:ext>
+    </p:extLst>
+  </p:cSld>
+  <p:clrMapOvr>
+    <a:masterClrMapping/>
+  </p:clrMapOvr>
+</p:notes>
 </file>
 
 <file path=ppt/slideLayouts/slideLayout1.xml><?xml version="1.0" encoding="utf-8"?>
@@ -271,7 +767,7 @@
           <a:p>
             <a:fld id="{3890243E-562A-9F4D-A043-C33BEFFC6485}" type="datetimeFigureOut">
               <a:rPr lang="en-US" smtClean="0"/>
-              <a:t>2/13/21</a:t>
+              <a:t>2/16/21</a:t>
             </a:fld>
             <a:endParaRPr lang="en-US"/>
           </a:p>
@@ -469,7 +965,7 @@
           <a:p>
             <a:fld id="{3890243E-562A-9F4D-A043-C33BEFFC6485}" type="datetimeFigureOut">
               <a:rPr lang="en-US" smtClean="0"/>
-              <a:t>2/13/21</a:t>
+              <a:t>2/16/21</a:t>
             </a:fld>
             <a:endParaRPr lang="en-US"/>
           </a:p>
@@ -677,7 +1173,7 @@
           <a:p>
             <a:fld id="{3890243E-562A-9F4D-A043-C33BEFFC6485}" type="datetimeFigureOut">
               <a:rPr lang="en-US" smtClean="0"/>
-              <a:t>2/13/21</a:t>
+              <a:t>2/16/21</a:t>
             </a:fld>
             <a:endParaRPr lang="en-US"/>
           </a:p>
@@ -875,7 +1371,7 @@
           <a:p>
             <a:fld id="{3890243E-562A-9F4D-A043-C33BEFFC6485}" type="datetimeFigureOut">
               <a:rPr lang="en-US" smtClean="0"/>
-              <a:t>2/13/21</a:t>
+              <a:t>2/16/21</a:t>
             </a:fld>
             <a:endParaRPr lang="en-US"/>
           </a:p>
@@ -1150,7 +1646,7 @@
           <a:p>
             <a:fld id="{3890243E-562A-9F4D-A043-C33BEFFC6485}" type="datetimeFigureOut">
               <a:rPr lang="en-US" smtClean="0"/>
-              <a:t>2/13/21</a:t>
+              <a:t>2/16/21</a:t>
             </a:fld>
             <a:endParaRPr lang="en-US"/>
           </a:p>
@@ -1415,7 +1911,7 @@
           <a:p>
             <a:fld id="{3890243E-562A-9F4D-A043-C33BEFFC6485}" type="datetimeFigureOut">
               <a:rPr lang="en-US" smtClean="0"/>
-              <a:t>2/13/21</a:t>
+              <a:t>2/16/21</a:t>
             </a:fld>
             <a:endParaRPr lang="en-US"/>
           </a:p>
@@ -1827,7 +2323,7 @@
           <a:p>
             <a:fld id="{3890243E-562A-9F4D-A043-C33BEFFC6485}" type="datetimeFigureOut">
               <a:rPr lang="en-US" smtClean="0"/>
-              <a:t>2/13/21</a:t>
+              <a:t>2/16/21</a:t>
             </a:fld>
             <a:endParaRPr lang="en-US"/>
           </a:p>
@@ -1968,7 +2464,7 @@
           <a:p>
             <a:fld id="{3890243E-562A-9F4D-A043-C33BEFFC6485}" type="datetimeFigureOut">
               <a:rPr lang="en-US" smtClean="0"/>
-              <a:t>2/13/21</a:t>
+              <a:t>2/16/21</a:t>
             </a:fld>
             <a:endParaRPr lang="en-US"/>
           </a:p>
@@ -2081,7 +2577,7 @@
           <a:p>
             <a:fld id="{3890243E-562A-9F4D-A043-C33BEFFC6485}" type="datetimeFigureOut">
               <a:rPr lang="en-US" smtClean="0"/>
-              <a:t>2/13/21</a:t>
+              <a:t>2/16/21</a:t>
             </a:fld>
             <a:endParaRPr lang="en-US"/>
           </a:p>
@@ -2392,7 +2888,7 @@
           <a:p>
             <a:fld id="{3890243E-562A-9F4D-A043-C33BEFFC6485}" type="datetimeFigureOut">
               <a:rPr lang="en-US" smtClean="0"/>
-              <a:t>2/13/21</a:t>
+              <a:t>2/16/21</a:t>
             </a:fld>
             <a:endParaRPr lang="en-US"/>
           </a:p>
@@ -2680,7 +3176,7 @@
           <a:p>
             <a:fld id="{3890243E-562A-9F4D-A043-C33BEFFC6485}" type="datetimeFigureOut">
               <a:rPr lang="en-US" smtClean="0"/>
-              <a:t>2/13/21</a:t>
+              <a:t>2/16/21</a:t>
             </a:fld>
             <a:endParaRPr lang="en-US"/>
           </a:p>
@@ -2921,7 +3417,7 @@
           <a:p>
             <a:fld id="{3890243E-562A-9F4D-A043-C33BEFFC6485}" type="datetimeFigureOut">
               <a:rPr lang="en-US" smtClean="0"/>
-              <a:t>2/13/21</a:t>
+              <a:t>2/16/21</a:t>
             </a:fld>
             <a:endParaRPr lang="en-US"/>
           </a:p>
@@ -3361,7 +3857,7 @@
             <a:pPr algn="ctr"/>
             <a:r>
               <a:rPr lang="en-US" dirty="0"/>
-              <a:t>Safety requirements</a:t>
+              <a:t>Safety Engineering</a:t>
             </a:r>
           </a:p>
         </p:txBody>
@@ -3448,6 +3944,511 @@
 </file>
 
 <file path=ppt/slides/slide10.xml><?xml version="1.0" encoding="utf-8"?>
+<p:sld xmlns:a="http://schemas.openxmlformats.org/drawingml/2006/main" xmlns:r="http://schemas.openxmlformats.org/officeDocument/2006/relationships" xmlns:p="http://schemas.openxmlformats.org/presentationml/2006/main">
+  <p:cSld>
+    <p:spTree>
+      <p:nvGrpSpPr>
+        <p:cNvPr id="1" name=""/>
+        <p:cNvGrpSpPr/>
+        <p:nvPr/>
+      </p:nvGrpSpPr>
+      <p:grpSpPr>
+        <a:xfrm>
+          <a:off x="0" y="0"/>
+          <a:ext cx="0" cy="0"/>
+          <a:chOff x="0" y="0"/>
+          <a:chExt cx="0" cy="0"/>
+        </a:xfrm>
+      </p:grpSpPr>
+      <p:sp>
+        <p:nvSpPr>
+          <p:cNvPr id="2" name="Title 1"/>
+          <p:cNvSpPr>
+            <a:spLocks noGrp="1"/>
+          </p:cNvSpPr>
+          <p:nvPr>
+            <p:ph type="title"/>
+          </p:nvPr>
+        </p:nvSpPr>
+        <p:spPr/>
+        <p:txBody>
+          <a:bodyPr/>
+          <a:lstStyle/>
+          <a:p>
+            <a:r>
+              <a:rPr lang="en-US" dirty="0"/>
+              <a:t>The risk triangle</a:t>
+            </a:r>
+            <a:r>
+              <a:rPr lang="en-GB" dirty="0"/>
+              <a:t> </a:t>
+            </a:r>
+            <a:endParaRPr lang="en-US" dirty="0"/>
+          </a:p>
+        </p:txBody>
+      </p:sp>
+      <p:pic>
+        <p:nvPicPr>
+          <p:cNvPr id="4" name="Content Placeholder 3" descr="12.2 RiskTriangle.eps"/>
+          <p:cNvPicPr>
+            <a:picLocks noGrp="1" noChangeAspect="1"/>
+          </p:cNvPicPr>
+          <p:nvPr>
+            <p:ph idx="1"/>
+          </p:nvPr>
+        </p:nvPicPr>
+        <p:blipFill>
+          <a:blip r:embed="rId2"/>
+          <a:srcRect l="-21258" r="-21258"/>
+          <a:stretch>
+            <a:fillRect/>
+          </a:stretch>
+        </p:blipFill>
+        <p:spPr>
+          <a:xfrm>
+            <a:off x="3113831" y="2080761"/>
+            <a:ext cx="6452568" cy="3548664"/>
+          </a:xfrm>
+        </p:spPr>
+      </p:pic>
+      <p:sp>
+        <p:nvSpPr>
+          <p:cNvPr id="5" name="Slide Number Placeholder 4"/>
+          <p:cNvSpPr>
+            <a:spLocks noGrp="1"/>
+          </p:cNvSpPr>
+          <p:nvPr>
+            <p:ph type="sldNum" sz="quarter" idx="12"/>
+          </p:nvPr>
+        </p:nvSpPr>
+        <p:spPr/>
+        <p:txBody>
+          <a:bodyPr/>
+          <a:lstStyle/>
+          <a:p>
+            <a:fld id="{348D88E4-469E-644E-9952-CB69E8EF64CD}" type="slidenum">
+              <a:rPr lang="en-US" smtClean="0"/>
+              <a:pPr/>
+              <a:t>10</a:t>
+            </a:fld>
+            <a:endParaRPr lang="en-US"/>
+          </a:p>
+        </p:txBody>
+      </p:sp>
+      <p:sp>
+        <p:nvSpPr>
+          <p:cNvPr id="6" name="Footer Placeholder 5"/>
+          <p:cNvSpPr>
+            <a:spLocks noGrp="1"/>
+          </p:cNvSpPr>
+          <p:nvPr>
+            <p:ph type="ftr" sz="quarter" idx="11"/>
+          </p:nvPr>
+        </p:nvSpPr>
+        <p:spPr/>
+        <p:txBody>
+          <a:bodyPr/>
+          <a:lstStyle/>
+          <a:p>
+            <a:r>
+              <a:rPr lang="en-US"/>
+              <a:t>Chapter 12 Safety Engineering</a:t>
+            </a:r>
+          </a:p>
+        </p:txBody>
+      </p:sp>
+      <p:sp>
+        <p:nvSpPr>
+          <p:cNvPr id="3" name="Date Placeholder 2"/>
+          <p:cNvSpPr>
+            <a:spLocks noGrp="1"/>
+          </p:cNvSpPr>
+          <p:nvPr>
+            <p:ph type="dt" sz="half" idx="10"/>
+          </p:nvPr>
+        </p:nvSpPr>
+        <p:spPr/>
+        <p:txBody>
+          <a:bodyPr/>
+          <a:lstStyle/>
+          <a:p>
+            <a:r>
+              <a:rPr lang="en-GB"/>
+              <a:t>04/11/2014</a:t>
+            </a:r>
+            <a:endParaRPr lang="en-US"/>
+          </a:p>
+        </p:txBody>
+      </p:sp>
+    </p:spTree>
+    <p:extLst>
+      <p:ext uri="{BB962C8B-B14F-4D97-AF65-F5344CB8AC3E}">
+        <p14:creationId xmlns:p14="http://schemas.microsoft.com/office/powerpoint/2010/main" val="1494197617"/>
+      </p:ext>
+    </p:extLst>
+  </p:cSld>
+  <p:clrMapOvr>
+    <a:masterClrMapping/>
+  </p:clrMapOvr>
+</p:sld>
+</file>
+
+<file path=ppt/slides/slide11.xml><?xml version="1.0" encoding="utf-8"?>
+<p:sld xmlns:a="http://schemas.openxmlformats.org/drawingml/2006/main" xmlns:r="http://schemas.openxmlformats.org/officeDocument/2006/relationships" xmlns:p="http://schemas.openxmlformats.org/presentationml/2006/main">
+  <p:cSld>
+    <p:spTree>
+      <p:nvGrpSpPr>
+        <p:cNvPr id="1" name=""/>
+        <p:cNvGrpSpPr/>
+        <p:nvPr/>
+      </p:nvGrpSpPr>
+      <p:grpSpPr>
+        <a:xfrm>
+          <a:off x="0" y="0"/>
+          <a:ext cx="0" cy="0"/>
+          <a:chOff x="0" y="0"/>
+          <a:chExt cx="0" cy="0"/>
+        </a:xfrm>
+      </p:grpSpPr>
+      <p:sp>
+        <p:nvSpPr>
+          <p:cNvPr id="159746" name="Rectangle 2"/>
+          <p:cNvSpPr>
+            <a:spLocks noGrp="1" noChangeArrowheads="1"/>
+          </p:cNvSpPr>
+          <p:nvPr>
+            <p:ph type="title"/>
+          </p:nvPr>
+        </p:nvSpPr>
+        <p:spPr/>
+        <p:txBody>
+          <a:bodyPr/>
+          <a:lstStyle/>
+          <a:p>
+            <a:r>
+              <a:rPr lang="en-US"/>
+              <a:t>Social acceptability of risk</a:t>
+            </a:r>
+          </a:p>
+        </p:txBody>
+      </p:sp>
+      <p:sp>
+        <p:nvSpPr>
+          <p:cNvPr id="159747" name="Rectangle 3"/>
+          <p:cNvSpPr>
+            <a:spLocks noGrp="1" noChangeArrowheads="1"/>
+          </p:cNvSpPr>
+          <p:nvPr>
+            <p:ph idx="1"/>
+          </p:nvPr>
+        </p:nvSpPr>
+        <p:spPr/>
+        <p:txBody>
+          <a:bodyPr/>
+          <a:lstStyle/>
+          <a:p>
+            <a:pPr>
+              <a:lnSpc>
+                <a:spcPct val="90000"/>
+              </a:lnSpc>
+            </a:pPr>
+            <a:r>
+              <a:rPr lang="en-GB" sz="2400"/>
+              <a:t>The acceptability of a risk is determined by human, social and political considerations.</a:t>
+            </a:r>
+          </a:p>
+          <a:p>
+            <a:pPr>
+              <a:lnSpc>
+                <a:spcPct val="90000"/>
+              </a:lnSpc>
+            </a:pPr>
+            <a:r>
+              <a:rPr lang="en-GB" sz="2400"/>
+              <a:t>In most societies, the boundaries between the regions are pushed upwards with time i.e. society is less willing to accept risk</a:t>
+            </a:r>
+          </a:p>
+          <a:p>
+            <a:pPr lvl="1">
+              <a:lnSpc>
+                <a:spcPct val="90000"/>
+              </a:lnSpc>
+            </a:pPr>
+            <a:r>
+              <a:rPr lang="en-GB" sz="2000"/>
+              <a:t>For example, the costs of cleaning up pollution may be less than the costs of preventing it but this may not be socially acceptable.</a:t>
+            </a:r>
+          </a:p>
+          <a:p>
+            <a:pPr>
+              <a:lnSpc>
+                <a:spcPct val="90000"/>
+              </a:lnSpc>
+            </a:pPr>
+            <a:r>
+              <a:rPr lang="en-GB" sz="2400"/>
+              <a:t>Risk assessment is subjective</a:t>
+            </a:r>
+          </a:p>
+          <a:p>
+            <a:pPr lvl="1">
+              <a:lnSpc>
+                <a:spcPct val="90000"/>
+              </a:lnSpc>
+            </a:pPr>
+            <a:r>
+              <a:rPr lang="en-GB" sz="2000"/>
+              <a:t>Risks are identified as probable, unlikely, etc. This depends on who is making the assessment.</a:t>
+            </a:r>
+          </a:p>
+          <a:p>
+            <a:pPr>
+              <a:lnSpc>
+                <a:spcPct val="90000"/>
+              </a:lnSpc>
+            </a:pPr>
+            <a:endParaRPr lang="en-US" sz="2400"/>
+          </a:p>
+        </p:txBody>
+      </p:sp>
+      <p:sp>
+        <p:nvSpPr>
+          <p:cNvPr id="4" name="Slide Number Placeholder 3"/>
+          <p:cNvSpPr>
+            <a:spLocks noGrp="1"/>
+          </p:cNvSpPr>
+          <p:nvPr>
+            <p:ph type="sldNum" sz="quarter" idx="12"/>
+          </p:nvPr>
+        </p:nvSpPr>
+        <p:spPr/>
+        <p:txBody>
+          <a:bodyPr/>
+          <a:lstStyle/>
+          <a:p>
+            <a:fld id="{348D88E4-469E-644E-9952-CB69E8EF64CD}" type="slidenum">
+              <a:rPr lang="en-US" smtClean="0"/>
+              <a:pPr/>
+              <a:t>11</a:t>
+            </a:fld>
+            <a:endParaRPr lang="en-US"/>
+          </a:p>
+        </p:txBody>
+      </p:sp>
+      <p:sp>
+        <p:nvSpPr>
+          <p:cNvPr id="5" name="Footer Placeholder 4"/>
+          <p:cNvSpPr>
+            <a:spLocks noGrp="1"/>
+          </p:cNvSpPr>
+          <p:nvPr>
+            <p:ph type="ftr" sz="quarter" idx="11"/>
+          </p:nvPr>
+        </p:nvSpPr>
+        <p:spPr/>
+        <p:txBody>
+          <a:bodyPr/>
+          <a:lstStyle/>
+          <a:p>
+            <a:r>
+              <a:rPr lang="en-US"/>
+              <a:t>Chapter 12 Safety Engineering</a:t>
+            </a:r>
+          </a:p>
+        </p:txBody>
+      </p:sp>
+      <p:sp>
+        <p:nvSpPr>
+          <p:cNvPr id="2" name="Date Placeholder 1"/>
+          <p:cNvSpPr>
+            <a:spLocks noGrp="1"/>
+          </p:cNvSpPr>
+          <p:nvPr>
+            <p:ph type="dt" sz="half" idx="10"/>
+          </p:nvPr>
+        </p:nvSpPr>
+        <p:spPr/>
+        <p:txBody>
+          <a:bodyPr/>
+          <a:lstStyle/>
+          <a:p>
+            <a:r>
+              <a:rPr lang="en-GB"/>
+              <a:t>04/11/2014</a:t>
+            </a:r>
+            <a:endParaRPr lang="en-US"/>
+          </a:p>
+        </p:txBody>
+      </p:sp>
+    </p:spTree>
+    <p:extLst>
+      <p:ext uri="{BB962C8B-B14F-4D97-AF65-F5344CB8AC3E}">
+        <p14:creationId xmlns:p14="http://schemas.microsoft.com/office/powerpoint/2010/main" val="616399947"/>
+      </p:ext>
+    </p:extLst>
+  </p:cSld>
+  <p:clrMapOvr>
+    <a:masterClrMapping/>
+  </p:clrMapOvr>
+</p:sld>
+</file>
+
+<file path=ppt/slides/slide12.xml><?xml version="1.0" encoding="utf-8"?>
+<p:sld xmlns:a="http://schemas.openxmlformats.org/drawingml/2006/main" xmlns:r="http://schemas.openxmlformats.org/officeDocument/2006/relationships" xmlns:p="http://schemas.openxmlformats.org/presentationml/2006/main">
+  <p:cSld>
+    <p:spTree>
+      <p:nvGrpSpPr>
+        <p:cNvPr id="1" name=""/>
+        <p:cNvGrpSpPr/>
+        <p:nvPr/>
+      </p:nvGrpSpPr>
+      <p:grpSpPr>
+        <a:xfrm>
+          <a:off x="0" y="0"/>
+          <a:ext cx="0" cy="0"/>
+          <a:chOff x="0" y="0"/>
+          <a:chExt cx="0" cy="0"/>
+        </a:xfrm>
+      </p:grpSpPr>
+      <p:sp>
+        <p:nvSpPr>
+          <p:cNvPr id="161794" name="Rectangle 2"/>
+          <p:cNvSpPr>
+            <a:spLocks noGrp="1" noChangeArrowheads="1"/>
+          </p:cNvSpPr>
+          <p:nvPr>
+            <p:ph type="title"/>
+          </p:nvPr>
+        </p:nvSpPr>
+        <p:spPr/>
+        <p:txBody>
+          <a:bodyPr/>
+          <a:lstStyle/>
+          <a:p>
+            <a:r>
+              <a:rPr lang="en-US" dirty="0"/>
+              <a:t>Hazard assessment</a:t>
+            </a:r>
+          </a:p>
+        </p:txBody>
+      </p:sp>
+      <p:sp>
+        <p:nvSpPr>
+          <p:cNvPr id="161795" name="Rectangle 3"/>
+          <p:cNvSpPr>
+            <a:spLocks noGrp="1" noChangeArrowheads="1"/>
+          </p:cNvSpPr>
+          <p:nvPr>
+            <p:ph idx="1"/>
+          </p:nvPr>
+        </p:nvSpPr>
+        <p:spPr/>
+        <p:txBody>
+          <a:bodyPr/>
+          <a:lstStyle/>
+          <a:p>
+            <a:r>
+              <a:rPr lang="en-US"/>
+              <a:t>Estimate the risk probability and the risk severity.</a:t>
+            </a:r>
+          </a:p>
+          <a:p>
+            <a:r>
+              <a:rPr lang="en-US"/>
+              <a:t>It is not normally possible to do this precisely so relative values are used such as ‘unlikely’, ‘rare’, ‘very high’, etc.</a:t>
+            </a:r>
+          </a:p>
+          <a:p>
+            <a:r>
+              <a:rPr lang="en-US"/>
+              <a:t>The aim must be to exclude risks that are likely to arise or that have high severity.</a:t>
+            </a:r>
+          </a:p>
+        </p:txBody>
+      </p:sp>
+      <p:sp>
+        <p:nvSpPr>
+          <p:cNvPr id="4" name="Slide Number Placeholder 3"/>
+          <p:cNvSpPr>
+            <a:spLocks noGrp="1"/>
+          </p:cNvSpPr>
+          <p:nvPr>
+            <p:ph type="sldNum" sz="quarter" idx="12"/>
+          </p:nvPr>
+        </p:nvSpPr>
+        <p:spPr/>
+        <p:txBody>
+          <a:bodyPr/>
+          <a:lstStyle/>
+          <a:p>
+            <a:fld id="{348D88E4-469E-644E-9952-CB69E8EF64CD}" type="slidenum">
+              <a:rPr lang="en-US" smtClean="0"/>
+              <a:pPr/>
+              <a:t>12</a:t>
+            </a:fld>
+            <a:endParaRPr lang="en-US"/>
+          </a:p>
+        </p:txBody>
+      </p:sp>
+      <p:sp>
+        <p:nvSpPr>
+          <p:cNvPr id="5" name="Footer Placeholder 4"/>
+          <p:cNvSpPr>
+            <a:spLocks noGrp="1"/>
+          </p:cNvSpPr>
+          <p:nvPr>
+            <p:ph type="ftr" sz="quarter" idx="11"/>
+          </p:nvPr>
+        </p:nvSpPr>
+        <p:spPr/>
+        <p:txBody>
+          <a:bodyPr/>
+          <a:lstStyle/>
+          <a:p>
+            <a:r>
+              <a:rPr lang="en-US"/>
+              <a:t>Chapter 12 Safety Engineering</a:t>
+            </a:r>
+          </a:p>
+        </p:txBody>
+      </p:sp>
+      <p:sp>
+        <p:nvSpPr>
+          <p:cNvPr id="2" name="Date Placeholder 1"/>
+          <p:cNvSpPr>
+            <a:spLocks noGrp="1"/>
+          </p:cNvSpPr>
+          <p:nvPr>
+            <p:ph type="dt" sz="half" idx="10"/>
+          </p:nvPr>
+        </p:nvSpPr>
+        <p:spPr/>
+        <p:txBody>
+          <a:bodyPr/>
+          <a:lstStyle/>
+          <a:p>
+            <a:r>
+              <a:rPr lang="en-GB"/>
+              <a:t>04/11/2014</a:t>
+            </a:r>
+            <a:endParaRPr lang="en-US"/>
+          </a:p>
+        </p:txBody>
+      </p:sp>
+    </p:spTree>
+    <p:extLst>
+      <p:ext uri="{BB962C8B-B14F-4D97-AF65-F5344CB8AC3E}">
+        <p14:creationId xmlns:p14="http://schemas.microsoft.com/office/powerpoint/2010/main" val="3867773449"/>
+      </p:ext>
+    </p:extLst>
+  </p:cSld>
+  <p:clrMapOvr>
+    <a:masterClrMapping/>
+  </p:clrMapOvr>
+</p:sld>
+</file>
+
+<file path=ppt/slides/slide13.xml><?xml version="1.0" encoding="utf-8"?>
 <p:sld xmlns:a="http://schemas.openxmlformats.org/drawingml/2006/main" xmlns:r="http://schemas.openxmlformats.org/officeDocument/2006/relationships" xmlns:p="http://schemas.openxmlformats.org/presentationml/2006/main">
   <p:cSld>
     <p:spTree>
@@ -4937,7 +5938,7 @@
             <a:fld id="{348D88E4-469E-644E-9952-CB69E8EF64CD}" type="slidenum">
               <a:rPr lang="en-US" smtClean="0"/>
               <a:pPr/>
-              <a:t>10</a:t>
+              <a:t>13</a:t>
             </a:fld>
             <a:endParaRPr lang="en-US"/>
           </a:p>
@@ -4992,493 +5993,6 @@
     <p:extLst>
       <p:ext uri="{BB962C8B-B14F-4D97-AF65-F5344CB8AC3E}">
         <p14:creationId xmlns:p14="http://schemas.microsoft.com/office/powerpoint/2010/main" val="3031401806"/>
-      </p:ext>
-    </p:extLst>
-  </p:cSld>
-  <p:clrMapOvr>
-    <a:masterClrMapping/>
-  </p:clrMapOvr>
-</p:sld>
-</file>
-
-<file path=ppt/slides/slide11.xml><?xml version="1.0" encoding="utf-8"?>
-<p:sld xmlns:a="http://schemas.openxmlformats.org/drawingml/2006/main" xmlns:r="http://schemas.openxmlformats.org/officeDocument/2006/relationships" xmlns:p="http://schemas.openxmlformats.org/presentationml/2006/main">
-  <p:cSld>
-    <p:spTree>
-      <p:nvGrpSpPr>
-        <p:cNvPr id="1" name=""/>
-        <p:cNvGrpSpPr/>
-        <p:nvPr/>
-      </p:nvGrpSpPr>
-      <p:grpSpPr>
-        <a:xfrm>
-          <a:off x="0" y="0"/>
-          <a:ext cx="0" cy="0"/>
-          <a:chOff x="0" y="0"/>
-          <a:chExt cx="0" cy="0"/>
-        </a:xfrm>
-      </p:grpSpPr>
-      <p:sp>
-        <p:nvSpPr>
-          <p:cNvPr id="156674" name="Rectangle 2"/>
-          <p:cNvSpPr>
-            <a:spLocks noGrp="1" noChangeArrowheads="1"/>
-          </p:cNvSpPr>
-          <p:nvPr>
-            <p:ph type="title"/>
-          </p:nvPr>
-        </p:nvSpPr>
-        <p:spPr/>
-        <p:txBody>
-          <a:bodyPr/>
-          <a:lstStyle/>
-          <a:p>
-            <a:r>
-              <a:rPr lang="en-US" dirty="0"/>
-              <a:t>Hazard analysis</a:t>
-            </a:r>
-          </a:p>
-        </p:txBody>
-      </p:sp>
-      <p:sp>
-        <p:nvSpPr>
-          <p:cNvPr id="156675" name="Rectangle 3"/>
-          <p:cNvSpPr>
-            <a:spLocks noGrp="1" noChangeArrowheads="1"/>
-          </p:cNvSpPr>
-          <p:nvPr>
-            <p:ph idx="1"/>
-          </p:nvPr>
-        </p:nvSpPr>
-        <p:spPr/>
-        <p:txBody>
-          <a:bodyPr/>
-          <a:lstStyle/>
-          <a:p>
-            <a:pPr>
-              <a:lnSpc>
-                <a:spcPct val="90000"/>
-              </a:lnSpc>
-            </a:pPr>
-            <a:r>
-              <a:rPr lang="en-US"/>
-              <a:t>Concerned with discovering the root causes of risks in a particular system.</a:t>
-            </a:r>
-          </a:p>
-          <a:p>
-            <a:pPr>
-              <a:lnSpc>
-                <a:spcPct val="90000"/>
-              </a:lnSpc>
-            </a:pPr>
-            <a:r>
-              <a:rPr lang="en-US"/>
-              <a:t>Techniques have been mostly derived from safety-critical systems and can be</a:t>
-            </a:r>
-          </a:p>
-          <a:p>
-            <a:pPr lvl="1">
-              <a:lnSpc>
-                <a:spcPct val="90000"/>
-              </a:lnSpc>
-            </a:pPr>
-            <a:r>
-              <a:rPr lang="en-US"/>
-              <a:t>Inductive, bottom-up techniques. Start with a proposed system failure and assess the hazards that could arise from that failure;</a:t>
-            </a:r>
-          </a:p>
-          <a:p>
-            <a:pPr lvl="1">
-              <a:lnSpc>
-                <a:spcPct val="90000"/>
-              </a:lnSpc>
-            </a:pPr>
-            <a:r>
-              <a:rPr lang="en-US"/>
-              <a:t>Deductive, top-down techniques. Start with a hazard and deduce what the causes of this could be.</a:t>
-            </a:r>
-          </a:p>
-        </p:txBody>
-      </p:sp>
-      <p:sp>
-        <p:nvSpPr>
-          <p:cNvPr id="4" name="Slide Number Placeholder 3"/>
-          <p:cNvSpPr>
-            <a:spLocks noGrp="1"/>
-          </p:cNvSpPr>
-          <p:nvPr>
-            <p:ph type="sldNum" sz="quarter" idx="12"/>
-          </p:nvPr>
-        </p:nvSpPr>
-        <p:spPr/>
-        <p:txBody>
-          <a:bodyPr/>
-          <a:lstStyle/>
-          <a:p>
-            <a:fld id="{348D88E4-469E-644E-9952-CB69E8EF64CD}" type="slidenum">
-              <a:rPr lang="en-US" smtClean="0"/>
-              <a:pPr/>
-              <a:t>11</a:t>
-            </a:fld>
-            <a:endParaRPr lang="en-US"/>
-          </a:p>
-        </p:txBody>
-      </p:sp>
-      <p:sp>
-        <p:nvSpPr>
-          <p:cNvPr id="5" name="Footer Placeholder 4"/>
-          <p:cNvSpPr>
-            <a:spLocks noGrp="1"/>
-          </p:cNvSpPr>
-          <p:nvPr>
-            <p:ph type="ftr" sz="quarter" idx="11"/>
-          </p:nvPr>
-        </p:nvSpPr>
-        <p:spPr/>
-        <p:txBody>
-          <a:bodyPr/>
-          <a:lstStyle/>
-          <a:p>
-            <a:r>
-              <a:rPr lang="en-US"/>
-              <a:t>Chapter 12 Safety Engineering</a:t>
-            </a:r>
-          </a:p>
-        </p:txBody>
-      </p:sp>
-      <p:sp>
-        <p:nvSpPr>
-          <p:cNvPr id="2" name="Date Placeholder 1"/>
-          <p:cNvSpPr>
-            <a:spLocks noGrp="1"/>
-          </p:cNvSpPr>
-          <p:nvPr>
-            <p:ph type="dt" sz="half" idx="10"/>
-          </p:nvPr>
-        </p:nvSpPr>
-        <p:spPr/>
-        <p:txBody>
-          <a:bodyPr/>
-          <a:lstStyle/>
-          <a:p>
-            <a:r>
-              <a:rPr lang="en-GB"/>
-              <a:t>04/11/2014</a:t>
-            </a:r>
-            <a:endParaRPr lang="en-US"/>
-          </a:p>
-        </p:txBody>
-      </p:sp>
-    </p:spTree>
-    <p:extLst>
-      <p:ext uri="{BB962C8B-B14F-4D97-AF65-F5344CB8AC3E}">
-        <p14:creationId xmlns:p14="http://schemas.microsoft.com/office/powerpoint/2010/main" val="3618575076"/>
-      </p:ext>
-    </p:extLst>
-  </p:cSld>
-  <p:clrMapOvr>
-    <a:masterClrMapping/>
-  </p:clrMapOvr>
-</p:sld>
-</file>
-
-<file path=ppt/slides/slide12.xml><?xml version="1.0" encoding="utf-8"?>
-<p:sld xmlns:a="http://schemas.openxmlformats.org/drawingml/2006/main" xmlns:r="http://schemas.openxmlformats.org/officeDocument/2006/relationships" xmlns:p="http://schemas.openxmlformats.org/presentationml/2006/main">
-  <p:cSld>
-    <p:spTree>
-      <p:nvGrpSpPr>
-        <p:cNvPr id="1" name=""/>
-        <p:cNvGrpSpPr/>
-        <p:nvPr/>
-      </p:nvGrpSpPr>
-      <p:grpSpPr>
-        <a:xfrm>
-          <a:off x="0" y="0"/>
-          <a:ext cx="0" cy="0"/>
-          <a:chOff x="0" y="0"/>
-          <a:chExt cx="0" cy="0"/>
-        </a:xfrm>
-      </p:grpSpPr>
-      <p:sp>
-        <p:nvSpPr>
-          <p:cNvPr id="163842" name="Rectangle 2"/>
-          <p:cNvSpPr>
-            <a:spLocks noGrp="1" noChangeArrowheads="1"/>
-          </p:cNvSpPr>
-          <p:nvPr>
-            <p:ph type="title"/>
-          </p:nvPr>
-        </p:nvSpPr>
-        <p:spPr/>
-        <p:txBody>
-          <a:bodyPr/>
-          <a:lstStyle/>
-          <a:p>
-            <a:r>
-              <a:rPr lang="en-US"/>
-              <a:t>Fault-tree analysis</a:t>
-            </a:r>
-          </a:p>
-        </p:txBody>
-      </p:sp>
-      <p:sp>
-        <p:nvSpPr>
-          <p:cNvPr id="163843" name="Rectangle 3"/>
-          <p:cNvSpPr>
-            <a:spLocks noGrp="1" noChangeArrowheads="1"/>
-          </p:cNvSpPr>
-          <p:nvPr>
-            <p:ph idx="1"/>
-          </p:nvPr>
-        </p:nvSpPr>
-        <p:spPr/>
-        <p:txBody>
-          <a:bodyPr/>
-          <a:lstStyle/>
-          <a:p>
-            <a:r>
-              <a:rPr lang="en-US"/>
-              <a:t>A deductive top-down technique.</a:t>
-            </a:r>
-          </a:p>
-          <a:p>
-            <a:r>
-              <a:rPr lang="en-US"/>
-              <a:t>Put the risk or hazard at the root of the tree and identify the system states that could lead to that hazard.</a:t>
-            </a:r>
-          </a:p>
-          <a:p>
-            <a:r>
-              <a:rPr lang="en-US"/>
-              <a:t>Where appropriate, link these with ‘and’ or ‘or’ conditions.</a:t>
-            </a:r>
-          </a:p>
-          <a:p>
-            <a:r>
-              <a:rPr lang="en-US"/>
-              <a:t>A goal should be to minimise the number of single causes of system failure.</a:t>
-            </a:r>
-          </a:p>
-        </p:txBody>
-      </p:sp>
-      <p:sp>
-        <p:nvSpPr>
-          <p:cNvPr id="4" name="Slide Number Placeholder 3"/>
-          <p:cNvSpPr>
-            <a:spLocks noGrp="1"/>
-          </p:cNvSpPr>
-          <p:nvPr>
-            <p:ph type="sldNum" sz="quarter" idx="12"/>
-          </p:nvPr>
-        </p:nvSpPr>
-        <p:spPr/>
-        <p:txBody>
-          <a:bodyPr/>
-          <a:lstStyle/>
-          <a:p>
-            <a:fld id="{348D88E4-469E-644E-9952-CB69E8EF64CD}" type="slidenum">
-              <a:rPr lang="en-US" smtClean="0"/>
-              <a:pPr/>
-              <a:t>12</a:t>
-            </a:fld>
-            <a:endParaRPr lang="en-US"/>
-          </a:p>
-        </p:txBody>
-      </p:sp>
-      <p:sp>
-        <p:nvSpPr>
-          <p:cNvPr id="5" name="Footer Placeholder 4"/>
-          <p:cNvSpPr>
-            <a:spLocks noGrp="1"/>
-          </p:cNvSpPr>
-          <p:nvPr>
-            <p:ph type="ftr" sz="quarter" idx="11"/>
-          </p:nvPr>
-        </p:nvSpPr>
-        <p:spPr/>
-        <p:txBody>
-          <a:bodyPr/>
-          <a:lstStyle/>
-          <a:p>
-            <a:r>
-              <a:rPr lang="en-US"/>
-              <a:t>Chapter 12 Safety Engineering</a:t>
-            </a:r>
-          </a:p>
-        </p:txBody>
-      </p:sp>
-      <p:sp>
-        <p:nvSpPr>
-          <p:cNvPr id="2" name="Date Placeholder 1"/>
-          <p:cNvSpPr>
-            <a:spLocks noGrp="1"/>
-          </p:cNvSpPr>
-          <p:nvPr>
-            <p:ph type="dt" sz="half" idx="10"/>
-          </p:nvPr>
-        </p:nvSpPr>
-        <p:spPr/>
-        <p:txBody>
-          <a:bodyPr/>
-          <a:lstStyle/>
-          <a:p>
-            <a:r>
-              <a:rPr lang="en-GB"/>
-              <a:t>04/11/2014</a:t>
-            </a:r>
-            <a:endParaRPr lang="en-US"/>
-          </a:p>
-        </p:txBody>
-      </p:sp>
-    </p:spTree>
-    <p:extLst>
-      <p:ext uri="{BB962C8B-B14F-4D97-AF65-F5344CB8AC3E}">
-        <p14:creationId xmlns:p14="http://schemas.microsoft.com/office/powerpoint/2010/main" val="1197318001"/>
-      </p:ext>
-    </p:extLst>
-  </p:cSld>
-  <p:clrMapOvr>
-    <a:masterClrMapping/>
-  </p:clrMapOvr>
-</p:sld>
-</file>
-
-<file path=ppt/slides/slide13.xml><?xml version="1.0" encoding="utf-8"?>
-<p:sld xmlns:a="http://schemas.openxmlformats.org/drawingml/2006/main" xmlns:r="http://schemas.openxmlformats.org/officeDocument/2006/relationships" xmlns:p="http://schemas.openxmlformats.org/presentationml/2006/main">
-  <p:cSld>
-    <p:spTree>
-      <p:nvGrpSpPr>
-        <p:cNvPr id="1" name=""/>
-        <p:cNvGrpSpPr/>
-        <p:nvPr/>
-      </p:nvGrpSpPr>
-      <p:grpSpPr>
-        <a:xfrm>
-          <a:off x="0" y="0"/>
-          <a:ext cx="0" cy="0"/>
-          <a:chOff x="0" y="0"/>
-          <a:chExt cx="0" cy="0"/>
-        </a:xfrm>
-      </p:grpSpPr>
-      <p:sp>
-        <p:nvSpPr>
-          <p:cNvPr id="2" name="Title 1"/>
-          <p:cNvSpPr>
-            <a:spLocks noGrp="1"/>
-          </p:cNvSpPr>
-          <p:nvPr>
-            <p:ph type="title"/>
-          </p:nvPr>
-        </p:nvSpPr>
-        <p:spPr/>
-        <p:txBody>
-          <a:bodyPr/>
-          <a:lstStyle/>
-          <a:p>
-            <a:r>
-              <a:rPr lang="en-US" dirty="0"/>
-              <a:t>An example of a software fault tree</a:t>
-            </a:r>
-            <a:r>
-              <a:rPr lang="en-GB" dirty="0"/>
-              <a:t> </a:t>
-            </a:r>
-            <a:endParaRPr lang="en-US" dirty="0"/>
-          </a:p>
-        </p:txBody>
-      </p:sp>
-      <p:pic>
-        <p:nvPicPr>
-          <p:cNvPr id="4" name="Content Placeholder 3" descr="12.4 Fault-tree.eps"/>
-          <p:cNvPicPr>
-            <a:picLocks noGrp="1" noChangeAspect="1"/>
-          </p:cNvPicPr>
-          <p:nvPr>
-            <p:ph idx="1"/>
-          </p:nvPr>
-        </p:nvPicPr>
-        <p:blipFill>
-          <a:blip r:embed="rId2"/>
-          <a:srcRect l="-66803" r="-66803"/>
-          <a:stretch>
-            <a:fillRect/>
-          </a:stretch>
-        </p:blipFill>
-        <p:spPr/>
-      </p:pic>
-      <p:sp>
-        <p:nvSpPr>
-          <p:cNvPr id="5" name="Slide Number Placeholder 4"/>
-          <p:cNvSpPr>
-            <a:spLocks noGrp="1"/>
-          </p:cNvSpPr>
-          <p:nvPr>
-            <p:ph type="sldNum" sz="quarter" idx="12"/>
-          </p:nvPr>
-        </p:nvSpPr>
-        <p:spPr/>
-        <p:txBody>
-          <a:bodyPr/>
-          <a:lstStyle/>
-          <a:p>
-            <a:fld id="{348D88E4-469E-644E-9952-CB69E8EF64CD}" type="slidenum">
-              <a:rPr lang="en-US" smtClean="0"/>
-              <a:pPr/>
-              <a:t>13</a:t>
-            </a:fld>
-            <a:endParaRPr lang="en-US"/>
-          </a:p>
-        </p:txBody>
-      </p:sp>
-      <p:sp>
-        <p:nvSpPr>
-          <p:cNvPr id="6" name="Footer Placeholder 5"/>
-          <p:cNvSpPr>
-            <a:spLocks noGrp="1"/>
-          </p:cNvSpPr>
-          <p:nvPr>
-            <p:ph type="ftr" sz="quarter" idx="11"/>
-          </p:nvPr>
-        </p:nvSpPr>
-        <p:spPr/>
-        <p:txBody>
-          <a:bodyPr/>
-          <a:lstStyle/>
-          <a:p>
-            <a:r>
-              <a:rPr lang="en-US"/>
-              <a:t>Chapter 12 Safety Engineering</a:t>
-            </a:r>
-          </a:p>
-        </p:txBody>
-      </p:sp>
-      <p:sp>
-        <p:nvSpPr>
-          <p:cNvPr id="3" name="Date Placeholder 2"/>
-          <p:cNvSpPr>
-            <a:spLocks noGrp="1"/>
-          </p:cNvSpPr>
-          <p:nvPr>
-            <p:ph type="dt" sz="half" idx="10"/>
-          </p:nvPr>
-        </p:nvSpPr>
-        <p:spPr/>
-        <p:txBody>
-          <a:bodyPr/>
-          <a:lstStyle/>
-          <a:p>
-            <a:r>
-              <a:rPr lang="en-GB"/>
-              <a:t>04/11/2014</a:t>
-            </a:r>
-            <a:endParaRPr lang="en-US"/>
-          </a:p>
-        </p:txBody>
-      </p:sp>
-    </p:spTree>
-    <p:extLst>
-      <p:ext uri="{BB962C8B-B14F-4D97-AF65-F5344CB8AC3E}">
-        <p14:creationId xmlns:p14="http://schemas.microsoft.com/office/powerpoint/2010/main" val="2158868041"/>
       </p:ext>
     </p:extLst>
   </p:cSld>
@@ -5507,9 +6021,9 @@
       </p:grpSpPr>
       <p:sp>
         <p:nvSpPr>
-          <p:cNvPr id="2" name="Title 1"/>
-          <p:cNvSpPr>
-            <a:spLocks noGrp="1"/>
+          <p:cNvPr id="156674" name="Rectangle 2"/>
+          <p:cNvSpPr>
+            <a:spLocks noGrp="1" noChangeArrowheads="1"/>
           </p:cNvSpPr>
           <p:nvPr>
             <p:ph type="title"/>
@@ -5522,16 +6036,16 @@
           <a:p>
             <a:r>
               <a:rPr lang="en-US" dirty="0"/>
-              <a:t>Fault tree analysis</a:t>
-            </a:r>
-          </a:p>
-        </p:txBody>
-      </p:sp>
-      <p:sp>
-        <p:nvSpPr>
-          <p:cNvPr id="3" name="Content Placeholder 2"/>
-          <p:cNvSpPr>
-            <a:spLocks noGrp="1"/>
+              <a:t>Hazard analysis</a:t>
+            </a:r>
+          </a:p>
+        </p:txBody>
+      </p:sp>
+      <p:sp>
+        <p:nvSpPr>
+          <p:cNvPr id="156675" name="Rectangle 3"/>
+          <p:cNvSpPr>
+            <a:spLocks noGrp="1" noChangeArrowheads="1"/>
           </p:cNvSpPr>
           <p:nvPr>
             <p:ph idx="1"/>
@@ -5542,50 +6056,47 @@
           <a:bodyPr/>
           <a:lstStyle/>
           <a:p>
-            <a:r>
-              <a:rPr lang="en-US" dirty="0"/>
-              <a:t>Three possible conditions that can lead to delivery of incorrect dose of insulin</a:t>
-            </a:r>
-          </a:p>
-          <a:p>
-            <a:pPr lvl="1"/>
-            <a:r>
-              <a:rPr lang="en-US" dirty="0"/>
-              <a:t>Incorrect measurement of blood sugar level</a:t>
-            </a:r>
-          </a:p>
-          <a:p>
-            <a:pPr lvl="1"/>
-            <a:r>
-              <a:rPr lang="en-US" dirty="0"/>
-              <a:t>Failure of delivery system</a:t>
-            </a:r>
-          </a:p>
-          <a:p>
-            <a:pPr lvl="1"/>
-            <a:r>
-              <a:rPr lang="en-US" dirty="0"/>
-              <a:t>Dose delivered at wrong time</a:t>
-            </a:r>
-          </a:p>
-          <a:p>
-            <a:r>
-              <a:rPr lang="en-US" dirty="0"/>
-              <a:t>By analysis of the fault tree, root causes of these hazards related to software are:</a:t>
-            </a:r>
-          </a:p>
-          <a:p>
-            <a:pPr lvl="1"/>
-            <a:r>
-              <a:rPr lang="en-US" dirty="0"/>
-              <a:t>Algorithm error</a:t>
-            </a:r>
-          </a:p>
-          <a:p>
-            <a:pPr lvl="1"/>
-            <a:r>
-              <a:rPr lang="en-US" dirty="0"/>
-              <a:t>Arithmetic error</a:t>
+            <a:pPr>
+              <a:lnSpc>
+                <a:spcPct val="90000"/>
+              </a:lnSpc>
+            </a:pPr>
+            <a:r>
+              <a:rPr lang="en-US"/>
+              <a:t>Concerned with discovering the root causes of risks in a particular system.</a:t>
+            </a:r>
+          </a:p>
+          <a:p>
+            <a:pPr>
+              <a:lnSpc>
+                <a:spcPct val="90000"/>
+              </a:lnSpc>
+            </a:pPr>
+            <a:r>
+              <a:rPr lang="en-US"/>
+              <a:t>Techniques have been mostly derived from safety-critical systems and can be</a:t>
+            </a:r>
+          </a:p>
+          <a:p>
+            <a:pPr lvl="1">
+              <a:lnSpc>
+                <a:spcPct val="90000"/>
+              </a:lnSpc>
+            </a:pPr>
+            <a:r>
+              <a:rPr lang="en-US"/>
+              <a:t>Inductive, bottom-up techniques. Start with a proposed system failure and assess the hazards that could arise from that failure;</a:t>
+            </a:r>
+          </a:p>
+          <a:p>
+            <a:pPr lvl="1">
+              <a:lnSpc>
+                <a:spcPct val="90000"/>
+              </a:lnSpc>
+            </a:pPr>
+            <a:r>
+              <a:rPr lang="en-US"/>
+              <a:t>Deductive, top-down techniques. Start with a hazard and deduce what the causes of this could be.</a:t>
             </a:r>
           </a:p>
         </p:txBody>
@@ -5638,7 +6149,7 @@
       </p:sp>
       <p:sp>
         <p:nvSpPr>
-          <p:cNvPr id="6" name="Date Placeholder 5"/>
+          <p:cNvPr id="2" name="Date Placeholder 1"/>
           <p:cNvSpPr>
             <a:spLocks noGrp="1"/>
           </p:cNvSpPr>
@@ -5662,7 +6173,7 @@
     </p:spTree>
     <p:extLst>
       <p:ext uri="{BB962C8B-B14F-4D97-AF65-F5344CB8AC3E}">
-        <p14:creationId xmlns:p14="http://schemas.microsoft.com/office/powerpoint/2010/main" val="2187927581"/>
+        <p14:creationId xmlns:p14="http://schemas.microsoft.com/office/powerpoint/2010/main" val="3618575076"/>
       </p:ext>
     </p:extLst>
   </p:cSld>
@@ -5691,7 +6202,7 @@
       </p:grpSpPr>
       <p:sp>
         <p:nvSpPr>
-          <p:cNvPr id="157698" name="Rectangle 2"/>
+          <p:cNvPr id="163842" name="Rectangle 2"/>
           <p:cNvSpPr>
             <a:spLocks noGrp="1" noChangeArrowheads="1"/>
           </p:cNvSpPr>
@@ -5705,15 +6216,15 @@
           <a:lstStyle/>
           <a:p>
             <a:r>
-              <a:rPr lang="en-US" dirty="0"/>
-              <a:t>Risk reduction</a:t>
-            </a:r>
-          </a:p>
-        </p:txBody>
-      </p:sp>
-      <p:sp>
-        <p:nvSpPr>
-          <p:cNvPr id="157699" name="Rectangle 3"/>
+              <a:rPr lang="en-US"/>
+              <a:t>Fault-tree analysis</a:t>
+            </a:r>
+          </a:p>
+        </p:txBody>
+      </p:sp>
+      <p:sp>
+        <p:nvSpPr>
+          <p:cNvPr id="163843" name="Rectangle 3"/>
           <p:cNvSpPr>
             <a:spLocks noGrp="1" noChangeArrowheads="1"/>
           </p:cNvSpPr>
@@ -5727,35 +6238,26 @@
           <a:lstStyle/>
           <a:p>
             <a:r>
-              <a:rPr lang="en-US" dirty="0"/>
-              <a:t>The aim of this process is to identify dependability requirements that specify how the risks should be managed and ensure that accidents/incidents do not arise.</a:t>
-            </a:r>
-          </a:p>
-          <a:p>
-            <a:r>
-              <a:rPr lang="en-US" dirty="0"/>
-              <a:t>Risk reduction strategies</a:t>
-            </a:r>
-          </a:p>
-          <a:p>
-            <a:pPr lvl="1"/>
-            <a:r>
-              <a:rPr lang="en-US" dirty="0"/>
-              <a:t>Hazard avoidance;</a:t>
-            </a:r>
-          </a:p>
-          <a:p>
-            <a:pPr lvl="1"/>
-            <a:r>
-              <a:rPr lang="en-US" dirty="0"/>
-              <a:t>Hazard detection and removal;</a:t>
-            </a:r>
-          </a:p>
-          <a:p>
-            <a:pPr lvl="1"/>
-            <a:r>
-              <a:rPr lang="en-US" dirty="0"/>
-              <a:t>Damage limitation.</a:t>
+              <a:rPr lang="en-US"/>
+              <a:t>A deductive top-down technique.</a:t>
+            </a:r>
+          </a:p>
+          <a:p>
+            <a:r>
+              <a:rPr lang="en-US"/>
+              <a:t>Put the risk or hazard at the root of the tree and identify the system states that could lead to that hazard.</a:t>
+            </a:r>
+          </a:p>
+          <a:p>
+            <a:r>
+              <a:rPr lang="en-US"/>
+              <a:t>Where appropriate, link these with ‘and’ or ‘or’ conditions.</a:t>
+            </a:r>
+          </a:p>
+          <a:p>
+            <a:r>
+              <a:rPr lang="en-US"/>
+              <a:t>A goal should be to minimise the number of single causes of system failure.</a:t>
             </a:r>
           </a:p>
         </p:txBody>
@@ -5832,7 +6334,7 @@
     </p:spTree>
     <p:extLst>
       <p:ext uri="{BB962C8B-B14F-4D97-AF65-F5344CB8AC3E}">
-        <p14:creationId xmlns:p14="http://schemas.microsoft.com/office/powerpoint/2010/main" val="663616659"/>
+        <p14:creationId xmlns:p14="http://schemas.microsoft.com/office/powerpoint/2010/main" val="1197318001"/>
       </p:ext>
     </p:extLst>
   </p:cSld>
@@ -5861,9 +6363,9 @@
       </p:grpSpPr>
       <p:sp>
         <p:nvSpPr>
-          <p:cNvPr id="165890" name="Rectangle 2"/>
-          <p:cNvSpPr>
-            <a:spLocks noGrp="1" noChangeArrowheads="1"/>
+          <p:cNvPr id="2" name="Title 1"/>
+          <p:cNvSpPr>
+            <a:spLocks noGrp="1"/>
           </p:cNvSpPr>
           <p:nvPr>
             <p:ph type="title"/>
@@ -5875,49 +6377,39 @@
           <a:lstStyle/>
           <a:p>
             <a:r>
-              <a:rPr lang="en-US"/>
-              <a:t>Strategy use</a:t>
-            </a:r>
-          </a:p>
-        </p:txBody>
-      </p:sp>
-      <p:sp>
-        <p:nvSpPr>
-          <p:cNvPr id="165891" name="Rectangle 3"/>
-          <p:cNvSpPr>
-            <a:spLocks noGrp="1" noChangeArrowheads="1"/>
-          </p:cNvSpPr>
+              <a:rPr lang="en-US" dirty="0"/>
+              <a:t>An example of a software fault tree</a:t>
+            </a:r>
+            <a:r>
+              <a:rPr lang="en-GB" dirty="0"/>
+              <a:t> </a:t>
+            </a:r>
+            <a:endParaRPr lang="en-US" dirty="0"/>
+          </a:p>
+        </p:txBody>
+      </p:sp>
+      <p:pic>
+        <p:nvPicPr>
+          <p:cNvPr id="4" name="Content Placeholder 3" descr="12.4 Fault-tree.eps"/>
+          <p:cNvPicPr>
+            <a:picLocks noGrp="1" noChangeAspect="1"/>
+          </p:cNvPicPr>
           <p:nvPr>
             <p:ph idx="1"/>
           </p:nvPr>
-        </p:nvSpPr>
-        <p:spPr/>
-        <p:txBody>
-          <a:bodyPr/>
-          <a:lstStyle/>
-          <a:p>
-            <a:r>
-              <a:rPr lang="en-US"/>
-              <a:t>Normally, in critical systems, a mix of risk reduction strategies are used.</a:t>
-            </a:r>
-          </a:p>
-          <a:p>
-            <a:r>
-              <a:rPr lang="en-US"/>
-              <a:t>In a chemical plant control system, the system will include sensors to detect and correct excess pressure in the reactor.</a:t>
-            </a:r>
-          </a:p>
-          <a:p>
-            <a:r>
-              <a:rPr lang="en-US"/>
-              <a:t>However, it will also include an independent protection system that opens a relief valve if dangerously high pressure is detected.</a:t>
-            </a:r>
-          </a:p>
-        </p:txBody>
-      </p:sp>
-      <p:sp>
-        <p:nvSpPr>
-          <p:cNvPr id="4" name="Slide Number Placeholder 3"/>
+        </p:nvPicPr>
+        <p:blipFill>
+          <a:blip r:embed="rId2"/>
+          <a:srcRect l="-66803" r="-66803"/>
+          <a:stretch>
+            <a:fillRect/>
+          </a:stretch>
+        </p:blipFill>
+        <p:spPr/>
+      </p:pic>
+      <p:sp>
+        <p:nvSpPr>
+          <p:cNvPr id="5" name="Slide Number Placeholder 4"/>
           <p:cNvSpPr>
             <a:spLocks noGrp="1"/>
           </p:cNvSpPr>
@@ -5941,7 +6433,7 @@
       </p:sp>
       <p:sp>
         <p:nvSpPr>
-          <p:cNvPr id="5" name="Footer Placeholder 4"/>
+          <p:cNvPr id="6" name="Footer Placeholder 5"/>
           <p:cNvSpPr>
             <a:spLocks noGrp="1"/>
           </p:cNvSpPr>
@@ -5963,7 +6455,7 @@
       </p:sp>
       <p:sp>
         <p:nvSpPr>
-          <p:cNvPr id="2" name="Date Placeholder 1"/>
+          <p:cNvPr id="3" name="Date Placeholder 2"/>
           <p:cNvSpPr>
             <a:spLocks noGrp="1"/>
           </p:cNvSpPr>
@@ -5987,7 +6479,7 @@
     </p:spTree>
     <p:extLst>
       <p:ext uri="{BB962C8B-B14F-4D97-AF65-F5344CB8AC3E}">
-        <p14:creationId xmlns:p14="http://schemas.microsoft.com/office/powerpoint/2010/main" val="2523036836"/>
+        <p14:creationId xmlns:p14="http://schemas.microsoft.com/office/powerpoint/2010/main" val="2158868041"/>
       </p:ext>
     </p:extLst>
   </p:cSld>
@@ -6016,9 +6508,9 @@
       </p:grpSpPr>
       <p:sp>
         <p:nvSpPr>
-          <p:cNvPr id="166914" name="Rectangle 2"/>
-          <p:cNvSpPr>
-            <a:spLocks noGrp="1" noChangeArrowheads="1"/>
+          <p:cNvPr id="2" name="Title 1"/>
+          <p:cNvSpPr>
+            <a:spLocks noGrp="1"/>
           </p:cNvSpPr>
           <p:nvPr>
             <p:ph type="title"/>
@@ -6030,17 +6522,17 @@
           <a:lstStyle/>
           <a:p>
             <a:r>
-              <a:rPr lang="en-US"/>
-              <a:t>Insulin pump - software risks</a:t>
-            </a:r>
-          </a:p>
-        </p:txBody>
-      </p:sp>
-      <p:sp>
-        <p:nvSpPr>
-          <p:cNvPr id="166915" name="Rectangle 3"/>
-          <p:cNvSpPr>
-            <a:spLocks noGrp="1" noChangeArrowheads="1"/>
+              <a:rPr lang="en-US" dirty="0"/>
+              <a:t>Fault tree analysis</a:t>
+            </a:r>
+          </a:p>
+        </p:txBody>
+      </p:sp>
+      <p:sp>
+        <p:nvSpPr>
+          <p:cNvPr id="3" name="Content Placeholder 2"/>
+          <p:cNvSpPr>
+            <a:spLocks noGrp="1"/>
           </p:cNvSpPr>
           <p:nvPr>
             <p:ph idx="1"/>
@@ -6052,35 +6544,49 @@
           <a:lstStyle/>
           <a:p>
             <a:r>
-              <a:rPr lang="en-US"/>
+              <a:rPr lang="en-US" dirty="0"/>
+              <a:t>Three possible conditions that can lead to delivery of incorrect dose of insulin</a:t>
+            </a:r>
+          </a:p>
+          <a:p>
+            <a:pPr lvl="1"/>
+            <a:r>
+              <a:rPr lang="en-US" dirty="0"/>
+              <a:t>Incorrect measurement of blood sugar level</a:t>
+            </a:r>
+          </a:p>
+          <a:p>
+            <a:pPr lvl="1"/>
+            <a:r>
+              <a:rPr lang="en-US" dirty="0"/>
+              <a:t>Failure of delivery system</a:t>
+            </a:r>
+          </a:p>
+          <a:p>
+            <a:pPr lvl="1"/>
+            <a:r>
+              <a:rPr lang="en-US" dirty="0"/>
+              <a:t>Dose delivered at wrong time</a:t>
+            </a:r>
+          </a:p>
+          <a:p>
+            <a:r>
+              <a:rPr lang="en-US" dirty="0"/>
+              <a:t>By analysis of the fault tree, root causes of these hazards related to software are:</a:t>
+            </a:r>
+          </a:p>
+          <a:p>
+            <a:pPr lvl="1"/>
+            <a:r>
+              <a:rPr lang="en-US" dirty="0"/>
+              <a:t>Algorithm error</a:t>
+            </a:r>
+          </a:p>
+          <a:p>
+            <a:pPr lvl="1"/>
+            <a:r>
+              <a:rPr lang="en-US" dirty="0"/>
               <a:t>Arithmetic error</a:t>
-            </a:r>
-          </a:p>
-          <a:p>
-            <a:pPr lvl="1"/>
-            <a:r>
-              <a:rPr lang="en-US"/>
-              <a:t>A computation causes the value of a variable to overflow or underflow;</a:t>
-            </a:r>
-          </a:p>
-          <a:p>
-            <a:pPr lvl="1"/>
-            <a:r>
-              <a:rPr lang="en-US"/>
-              <a:t>Maybe include an exception handler for each type of arithmetic error.</a:t>
-            </a:r>
-          </a:p>
-          <a:p>
-            <a:r>
-              <a:rPr lang="en-US"/>
-              <a:t>Algorithmic error</a:t>
-            </a:r>
-          </a:p>
-          <a:p>
-            <a:pPr lvl="1"/>
-            <a:r>
-              <a:rPr lang="en-US"/>
-              <a:t>Compare dose to be delivered with previous dose or safe maximum doses. Reduce dose if too high.</a:t>
             </a:r>
           </a:p>
         </p:txBody>
@@ -6133,7 +6639,7 @@
       </p:sp>
       <p:sp>
         <p:nvSpPr>
-          <p:cNvPr id="2" name="Date Placeholder 1"/>
+          <p:cNvPr id="6" name="Date Placeholder 5"/>
           <p:cNvSpPr>
             <a:spLocks noGrp="1"/>
           </p:cNvSpPr>
@@ -6157,7 +6663,7 @@
     </p:spTree>
     <p:extLst>
       <p:ext uri="{BB962C8B-B14F-4D97-AF65-F5344CB8AC3E}">
-        <p14:creationId xmlns:p14="http://schemas.microsoft.com/office/powerpoint/2010/main" val="3877483119"/>
+        <p14:creationId xmlns:p14="http://schemas.microsoft.com/office/powerpoint/2010/main" val="2187927581"/>
       </p:ext>
     </p:extLst>
   </p:cSld>
@@ -6186,9 +6692,9 @@
       </p:grpSpPr>
       <p:sp>
         <p:nvSpPr>
-          <p:cNvPr id="2" name="Title 1"/>
-          <p:cNvSpPr>
-            <a:spLocks noGrp="1"/>
+          <p:cNvPr id="157698" name="Rectangle 2"/>
+          <p:cNvSpPr>
+            <a:spLocks noGrp="1" noChangeArrowheads="1"/>
           </p:cNvSpPr>
           <p:nvPr>
             <p:ph type="title"/>
@@ -6201,139 +6707,63 @@
           <a:p>
             <a:r>
               <a:rPr lang="en-US" dirty="0"/>
-              <a:t>Examples of safety requirements</a:t>
-            </a:r>
-            <a:r>
-              <a:rPr lang="en-GB" dirty="0"/>
-              <a:t> </a:t>
-            </a:r>
-            <a:endParaRPr lang="en-US" dirty="0"/>
-          </a:p>
-        </p:txBody>
-      </p:sp>
-      <p:sp>
-        <p:nvSpPr>
-          <p:cNvPr id="4" name="TextBox 3"/>
-          <p:cNvSpPr txBox="1"/>
-          <p:nvPr/>
-        </p:nvSpPr>
-        <p:spPr>
-          <a:xfrm>
-            <a:off x="2148660" y="1898120"/>
-            <a:ext cx="7713962" cy="4431983"/>
-          </a:xfrm>
-          <a:prstGeom prst="rect">
-            <a:avLst/>
-          </a:prstGeom>
-          <a:solidFill>
-            <a:srgbClr val="FFFF00">
-              <a:alpha val="35000"/>
-            </a:srgbClr>
-          </a:solidFill>
-        </p:spPr>
-        <p:txBody>
-          <a:bodyPr wrap="square" rtlCol="0">
-            <a:spAutoFit/>
-          </a:bodyPr>
-          <a:lstStyle/>
-          <a:p>
-            <a:pPr>
-              <a:spcAft>
-                <a:spcPts val="600"/>
-              </a:spcAft>
-            </a:pPr>
-            <a:r>
-              <a:rPr lang="en-GB" b="1" dirty="0"/>
-              <a:t>SR1</a:t>
-            </a:r>
-            <a:r>
-              <a:rPr lang="en-GB" dirty="0"/>
-              <a:t>: The system shall not deliver a single dose of insulin that is greater than a specified maximum dose for a system user.</a:t>
-            </a:r>
-          </a:p>
-          <a:p>
-            <a:pPr>
-              <a:spcAft>
-                <a:spcPts val="600"/>
-              </a:spcAft>
-            </a:pPr>
-            <a:r>
-              <a:rPr lang="en-GB" b="1" dirty="0"/>
-              <a:t>SR2</a:t>
-            </a:r>
-            <a:r>
-              <a:rPr lang="en-GB" dirty="0"/>
-              <a:t>: The system shall not deliver a daily cumulative dose of insulin that is greater than a specified maximum daily dose for a system user.</a:t>
-            </a:r>
-          </a:p>
-          <a:p>
-            <a:pPr>
-              <a:spcAft>
-                <a:spcPts val="600"/>
-              </a:spcAft>
-            </a:pPr>
-            <a:r>
-              <a:rPr lang="en-GB" b="1" dirty="0"/>
-              <a:t>SR3</a:t>
-            </a:r>
-            <a:r>
-              <a:rPr lang="en-GB" dirty="0"/>
-              <a:t>: The system shall include a hardware diagnostic facility that shall be executed at least four times per hour.</a:t>
-            </a:r>
-          </a:p>
-          <a:p>
-            <a:pPr>
-              <a:spcAft>
-                <a:spcPts val="600"/>
-              </a:spcAft>
-            </a:pPr>
-            <a:r>
-              <a:rPr lang="en-GB" b="1" dirty="0"/>
-              <a:t>SR4</a:t>
-            </a:r>
-            <a:r>
-              <a:rPr lang="en-GB" dirty="0"/>
-              <a:t>: The system shall include an exception handler for all of the exceptions that are identified in Table 3.</a:t>
-            </a:r>
-          </a:p>
-          <a:p>
-            <a:pPr>
-              <a:spcAft>
-                <a:spcPts val="600"/>
-              </a:spcAft>
-            </a:pPr>
-            <a:r>
-              <a:rPr lang="en-GB" b="1" dirty="0"/>
-              <a:t>SR5</a:t>
-            </a:r>
-            <a:r>
-              <a:rPr lang="en-GB" dirty="0"/>
-              <a:t>: The audible alarm shall be sounded when any hardware or software anomaly is discovered and a diagnostic message, as defined in Table 4, shall be displayed.</a:t>
-            </a:r>
-          </a:p>
-          <a:p>
-            <a:pPr>
-              <a:spcAft>
-                <a:spcPts val="600"/>
-              </a:spcAft>
-            </a:pPr>
-            <a:r>
-              <a:rPr lang="en-GB" b="1" dirty="0"/>
-              <a:t>SR6</a:t>
-            </a:r>
-            <a:r>
-              <a:rPr lang="en-GB" dirty="0"/>
-              <a:t>: In the event of an alarm, insulin delivery shall be suspended until the user has reset the system and cleared the alarm.</a:t>
-            </a:r>
-          </a:p>
-          <a:p>
-            <a:endParaRPr lang="en-US" dirty="0"/>
-          </a:p>
-        </p:txBody>
-      </p:sp>
-      <p:sp>
-        <p:nvSpPr>
-          <p:cNvPr id="5" name="Slide Number Placeholder 4"/>
+              <a:t>Risk reduction</a:t>
+            </a:r>
+          </a:p>
+        </p:txBody>
+      </p:sp>
+      <p:sp>
+        <p:nvSpPr>
+          <p:cNvPr id="157699" name="Rectangle 3"/>
+          <p:cNvSpPr>
+            <a:spLocks noGrp="1" noChangeArrowheads="1"/>
+          </p:cNvSpPr>
+          <p:nvPr>
+            <p:ph idx="1"/>
+          </p:nvPr>
+        </p:nvSpPr>
+        <p:spPr/>
+        <p:txBody>
+          <a:bodyPr/>
+          <a:lstStyle/>
+          <a:p>
+            <a:r>
+              <a:rPr lang="en-US" dirty="0"/>
+              <a:t>The aim of this process is to identify dependability requirements that specify how the risks should be managed and ensure that accidents/incidents do not arise.</a:t>
+            </a:r>
+          </a:p>
+          <a:p>
+            <a:r>
+              <a:rPr lang="en-US" dirty="0"/>
+              <a:t>Risk reduction strategies</a:t>
+            </a:r>
+          </a:p>
+          <a:p>
+            <a:pPr lvl="1"/>
+            <a:r>
+              <a:rPr lang="en-US" dirty="0"/>
+              <a:t>Hazard avoidance;</a:t>
+            </a:r>
+          </a:p>
+          <a:p>
+            <a:pPr lvl="1"/>
+            <a:r>
+              <a:rPr lang="en-US" dirty="0"/>
+              <a:t>Hazard detection and removal;</a:t>
+            </a:r>
+          </a:p>
+          <a:p>
+            <a:pPr lvl="1"/>
+            <a:r>
+              <a:rPr lang="en-US" dirty="0"/>
+              <a:t>Damage limitation.</a:t>
+            </a:r>
+          </a:p>
+        </p:txBody>
+      </p:sp>
+      <p:sp>
+        <p:nvSpPr>
+          <p:cNvPr id="4" name="Slide Number Placeholder 3"/>
           <p:cNvSpPr>
             <a:spLocks noGrp="1"/>
           </p:cNvSpPr>
@@ -6357,7 +6787,7 @@
       </p:sp>
       <p:sp>
         <p:nvSpPr>
-          <p:cNvPr id="6" name="Footer Placeholder 5"/>
+          <p:cNvPr id="5" name="Footer Placeholder 4"/>
           <p:cNvSpPr>
             <a:spLocks noGrp="1"/>
           </p:cNvSpPr>
@@ -6379,7 +6809,7 @@
       </p:sp>
       <p:sp>
         <p:nvSpPr>
-          <p:cNvPr id="3" name="Date Placeholder 2"/>
+          <p:cNvPr id="2" name="Date Placeholder 1"/>
           <p:cNvSpPr>
             <a:spLocks noGrp="1"/>
           </p:cNvSpPr>
@@ -6403,7 +6833,162 @@
     </p:spTree>
     <p:extLst>
       <p:ext uri="{BB962C8B-B14F-4D97-AF65-F5344CB8AC3E}">
-        <p14:creationId xmlns:p14="http://schemas.microsoft.com/office/powerpoint/2010/main" val="3311877693"/>
+        <p14:creationId xmlns:p14="http://schemas.microsoft.com/office/powerpoint/2010/main" val="663616659"/>
+      </p:ext>
+    </p:extLst>
+  </p:cSld>
+  <p:clrMapOvr>
+    <a:masterClrMapping/>
+  </p:clrMapOvr>
+</p:sld>
+</file>
+
+<file path=ppt/slides/slide19.xml><?xml version="1.0" encoding="utf-8"?>
+<p:sld xmlns:a="http://schemas.openxmlformats.org/drawingml/2006/main" xmlns:r="http://schemas.openxmlformats.org/officeDocument/2006/relationships" xmlns:p="http://schemas.openxmlformats.org/presentationml/2006/main">
+  <p:cSld>
+    <p:spTree>
+      <p:nvGrpSpPr>
+        <p:cNvPr id="1" name=""/>
+        <p:cNvGrpSpPr/>
+        <p:nvPr/>
+      </p:nvGrpSpPr>
+      <p:grpSpPr>
+        <a:xfrm>
+          <a:off x="0" y="0"/>
+          <a:ext cx="0" cy="0"/>
+          <a:chOff x="0" y="0"/>
+          <a:chExt cx="0" cy="0"/>
+        </a:xfrm>
+      </p:grpSpPr>
+      <p:sp>
+        <p:nvSpPr>
+          <p:cNvPr id="165890" name="Rectangle 2"/>
+          <p:cNvSpPr>
+            <a:spLocks noGrp="1" noChangeArrowheads="1"/>
+          </p:cNvSpPr>
+          <p:nvPr>
+            <p:ph type="title"/>
+          </p:nvPr>
+        </p:nvSpPr>
+        <p:spPr/>
+        <p:txBody>
+          <a:bodyPr/>
+          <a:lstStyle/>
+          <a:p>
+            <a:r>
+              <a:rPr lang="en-US"/>
+              <a:t>Strategy use</a:t>
+            </a:r>
+          </a:p>
+        </p:txBody>
+      </p:sp>
+      <p:sp>
+        <p:nvSpPr>
+          <p:cNvPr id="165891" name="Rectangle 3"/>
+          <p:cNvSpPr>
+            <a:spLocks noGrp="1" noChangeArrowheads="1"/>
+          </p:cNvSpPr>
+          <p:nvPr>
+            <p:ph idx="1"/>
+          </p:nvPr>
+        </p:nvSpPr>
+        <p:spPr/>
+        <p:txBody>
+          <a:bodyPr/>
+          <a:lstStyle/>
+          <a:p>
+            <a:r>
+              <a:rPr lang="en-US"/>
+              <a:t>Normally, in critical systems, a mix of risk reduction strategies are used.</a:t>
+            </a:r>
+          </a:p>
+          <a:p>
+            <a:r>
+              <a:rPr lang="en-US"/>
+              <a:t>In a chemical plant control system, the system will include sensors to detect and correct excess pressure in the reactor.</a:t>
+            </a:r>
+          </a:p>
+          <a:p>
+            <a:r>
+              <a:rPr lang="en-US"/>
+              <a:t>However, it will also include an independent protection system that opens a relief valve if dangerously high pressure is detected.</a:t>
+            </a:r>
+          </a:p>
+        </p:txBody>
+      </p:sp>
+      <p:sp>
+        <p:nvSpPr>
+          <p:cNvPr id="4" name="Slide Number Placeholder 3"/>
+          <p:cNvSpPr>
+            <a:spLocks noGrp="1"/>
+          </p:cNvSpPr>
+          <p:nvPr>
+            <p:ph type="sldNum" sz="quarter" idx="12"/>
+          </p:nvPr>
+        </p:nvSpPr>
+        <p:spPr/>
+        <p:txBody>
+          <a:bodyPr/>
+          <a:lstStyle/>
+          <a:p>
+            <a:fld id="{348D88E4-469E-644E-9952-CB69E8EF64CD}" type="slidenum">
+              <a:rPr lang="en-US" smtClean="0"/>
+              <a:pPr/>
+              <a:t>19</a:t>
+            </a:fld>
+            <a:endParaRPr lang="en-US"/>
+          </a:p>
+        </p:txBody>
+      </p:sp>
+      <p:sp>
+        <p:nvSpPr>
+          <p:cNvPr id="5" name="Footer Placeholder 4"/>
+          <p:cNvSpPr>
+            <a:spLocks noGrp="1"/>
+          </p:cNvSpPr>
+          <p:nvPr>
+            <p:ph type="ftr" sz="quarter" idx="11"/>
+          </p:nvPr>
+        </p:nvSpPr>
+        <p:spPr/>
+        <p:txBody>
+          <a:bodyPr/>
+          <a:lstStyle/>
+          <a:p>
+            <a:r>
+              <a:rPr lang="en-US"/>
+              <a:t>Chapter 12 Safety Engineering</a:t>
+            </a:r>
+          </a:p>
+        </p:txBody>
+      </p:sp>
+      <p:sp>
+        <p:nvSpPr>
+          <p:cNvPr id="2" name="Date Placeholder 1"/>
+          <p:cNvSpPr>
+            <a:spLocks noGrp="1"/>
+          </p:cNvSpPr>
+          <p:nvPr>
+            <p:ph type="dt" sz="half" idx="10"/>
+          </p:nvPr>
+        </p:nvSpPr>
+        <p:spPr/>
+        <p:txBody>
+          <a:bodyPr/>
+          <a:lstStyle/>
+          <a:p>
+            <a:r>
+              <a:rPr lang="en-GB"/>
+              <a:t>04/11/2014</a:t>
+            </a:r>
+            <a:endParaRPr lang="en-US"/>
+          </a:p>
+        </p:txBody>
+      </p:sp>
+    </p:spTree>
+    <p:extLst>
+      <p:ext uri="{BB962C8B-B14F-4D97-AF65-F5344CB8AC3E}">
+        <p14:creationId xmlns:p14="http://schemas.microsoft.com/office/powerpoint/2010/main" val="2523036836"/>
       </p:ext>
     </p:extLst>
   </p:cSld>
@@ -6432,9 +7017,9 @@
       </p:grpSpPr>
       <p:sp>
         <p:nvSpPr>
-          <p:cNvPr id="2" name="Title 1"/>
-          <p:cNvSpPr>
-            <a:spLocks noGrp="1"/>
+          <p:cNvPr id="39938" name="Rectangle 2"/>
+          <p:cNvSpPr>
+            <a:spLocks noGrp="1" noChangeArrowheads="1"/>
           </p:cNvSpPr>
           <p:nvPr>
             <p:ph type="title"/>
@@ -6446,17 +7031,17 @@
           <a:lstStyle/>
           <a:p>
             <a:r>
-              <a:rPr lang="en-US" dirty="0"/>
-              <a:t>Safety specification</a:t>
-            </a:r>
-          </a:p>
-        </p:txBody>
-      </p:sp>
-      <p:sp>
-        <p:nvSpPr>
-          <p:cNvPr id="3" name="Content Placeholder 2"/>
-          <p:cNvSpPr>
-            <a:spLocks noGrp="1"/>
+              <a:rPr lang="en-GB"/>
+              <a:t>Safety</a:t>
+            </a:r>
+          </a:p>
+        </p:txBody>
+      </p:sp>
+      <p:sp>
+        <p:nvSpPr>
+          <p:cNvPr id="39939" name="Rectangle 3"/>
+          <p:cNvSpPr>
+            <a:spLocks noGrp="1" noChangeArrowheads="1"/>
           </p:cNvSpPr>
           <p:nvPr>
             <p:ph idx="1"/>
@@ -6468,34 +7053,14 @@
           <a:lstStyle/>
           <a:p>
             <a:r>
-              <a:rPr lang="en-US" dirty="0"/>
-              <a:t>The goal of safety requirements engineering is to identify protection requirements that ensure that system failures do not cause injury or death or environmental damage.</a:t>
-            </a:r>
-          </a:p>
-          <a:p>
-            <a:r>
-              <a:rPr lang="en-US" dirty="0"/>
-              <a:t>Safety requirements may be ‘shall not’ requirements i.e. they define situations and events that should never occur.</a:t>
-            </a:r>
-          </a:p>
-          <a:p>
-            <a:r>
-              <a:rPr lang="en-US" dirty="0"/>
-              <a:t>Functional safety requirements define:</a:t>
-            </a:r>
-          </a:p>
-          <a:p>
-            <a:pPr lvl="1"/>
-            <a:r>
-              <a:rPr lang="en-US" dirty="0"/>
-              <a:t>Checking and recovery features that should be included in a system</a:t>
-            </a:r>
-          </a:p>
-          <a:p>
-            <a:pPr lvl="1"/>
-            <a:r>
-              <a:rPr lang="en-US" dirty="0"/>
-              <a:t>Features that provide protection against system failures and external attacks</a:t>
+              <a:rPr lang="en-GB" sz="2400" dirty="0"/>
+              <a:t>Safety is a property of a system that reflects the system’s ability to operate, normally or abnormally, without danger of causing human injury or death and without damage to the system’s environment.</a:t>
+            </a:r>
+          </a:p>
+          <a:p>
+            <a:r>
+              <a:rPr lang="en-GB" sz="2400" dirty="0"/>
+              <a:t>It is important to consider software safety as most devices whose failure is critical now incorporate software-based control systems. </a:t>
             </a:r>
           </a:p>
         </p:txBody>
@@ -6515,7 +7080,7 @@
           <a:bodyPr/>
           <a:lstStyle/>
           <a:p>
-            <a:fld id="{348D88E4-469E-644E-9952-CB69E8EF64CD}" type="slidenum">
+            <a:fld id="{745CE82A-87C3-2841-AAF3-37DF1E34DC62}" type="slidenum">
               <a:rPr lang="en-US" smtClean="0"/>
               <a:pPr/>
               <a:t>2</a:t>
@@ -6548,7 +7113,7 @@
       </p:sp>
       <p:sp>
         <p:nvSpPr>
-          <p:cNvPr id="6" name="Date Placeholder 5"/>
+          <p:cNvPr id="2" name="Date Placeholder 1"/>
           <p:cNvSpPr>
             <a:spLocks noGrp="1"/>
           </p:cNvSpPr>
@@ -6572,7 +7137,423 @@
     </p:spTree>
     <p:extLst>
       <p:ext uri="{BB962C8B-B14F-4D97-AF65-F5344CB8AC3E}">
-        <p14:creationId xmlns:p14="http://schemas.microsoft.com/office/powerpoint/2010/main" val="3822513494"/>
+        <p14:creationId xmlns:p14="http://schemas.microsoft.com/office/powerpoint/2010/main" val="4103163772"/>
+      </p:ext>
+    </p:extLst>
+  </p:cSld>
+  <p:clrMapOvr>
+    <a:masterClrMapping/>
+  </p:clrMapOvr>
+</p:sld>
+</file>
+
+<file path=ppt/slides/slide20.xml><?xml version="1.0" encoding="utf-8"?>
+<p:sld xmlns:a="http://schemas.openxmlformats.org/drawingml/2006/main" xmlns:r="http://schemas.openxmlformats.org/officeDocument/2006/relationships" xmlns:p="http://schemas.openxmlformats.org/presentationml/2006/main">
+  <p:cSld>
+    <p:spTree>
+      <p:nvGrpSpPr>
+        <p:cNvPr id="1" name=""/>
+        <p:cNvGrpSpPr/>
+        <p:nvPr/>
+      </p:nvGrpSpPr>
+      <p:grpSpPr>
+        <a:xfrm>
+          <a:off x="0" y="0"/>
+          <a:ext cx="0" cy="0"/>
+          <a:chOff x="0" y="0"/>
+          <a:chExt cx="0" cy="0"/>
+        </a:xfrm>
+      </p:grpSpPr>
+      <p:sp>
+        <p:nvSpPr>
+          <p:cNvPr id="166914" name="Rectangle 2"/>
+          <p:cNvSpPr>
+            <a:spLocks noGrp="1" noChangeArrowheads="1"/>
+          </p:cNvSpPr>
+          <p:nvPr>
+            <p:ph type="title"/>
+          </p:nvPr>
+        </p:nvSpPr>
+        <p:spPr/>
+        <p:txBody>
+          <a:bodyPr/>
+          <a:lstStyle/>
+          <a:p>
+            <a:r>
+              <a:rPr lang="en-US"/>
+              <a:t>Insulin pump - software risks</a:t>
+            </a:r>
+          </a:p>
+        </p:txBody>
+      </p:sp>
+      <p:sp>
+        <p:nvSpPr>
+          <p:cNvPr id="166915" name="Rectangle 3"/>
+          <p:cNvSpPr>
+            <a:spLocks noGrp="1" noChangeArrowheads="1"/>
+          </p:cNvSpPr>
+          <p:nvPr>
+            <p:ph idx="1"/>
+          </p:nvPr>
+        </p:nvSpPr>
+        <p:spPr/>
+        <p:txBody>
+          <a:bodyPr/>
+          <a:lstStyle/>
+          <a:p>
+            <a:r>
+              <a:rPr lang="en-US"/>
+              <a:t>Arithmetic error</a:t>
+            </a:r>
+          </a:p>
+          <a:p>
+            <a:pPr lvl="1"/>
+            <a:r>
+              <a:rPr lang="en-US"/>
+              <a:t>A computation causes the value of a variable to overflow or underflow;</a:t>
+            </a:r>
+          </a:p>
+          <a:p>
+            <a:pPr lvl="1"/>
+            <a:r>
+              <a:rPr lang="en-US"/>
+              <a:t>Maybe include an exception handler for each type of arithmetic error.</a:t>
+            </a:r>
+          </a:p>
+          <a:p>
+            <a:r>
+              <a:rPr lang="en-US"/>
+              <a:t>Algorithmic error</a:t>
+            </a:r>
+          </a:p>
+          <a:p>
+            <a:pPr lvl="1"/>
+            <a:r>
+              <a:rPr lang="en-US"/>
+              <a:t>Compare dose to be delivered with previous dose or safe maximum doses. Reduce dose if too high.</a:t>
+            </a:r>
+          </a:p>
+        </p:txBody>
+      </p:sp>
+      <p:sp>
+        <p:nvSpPr>
+          <p:cNvPr id="4" name="Slide Number Placeholder 3"/>
+          <p:cNvSpPr>
+            <a:spLocks noGrp="1"/>
+          </p:cNvSpPr>
+          <p:nvPr>
+            <p:ph type="sldNum" sz="quarter" idx="12"/>
+          </p:nvPr>
+        </p:nvSpPr>
+        <p:spPr/>
+        <p:txBody>
+          <a:bodyPr/>
+          <a:lstStyle/>
+          <a:p>
+            <a:fld id="{348D88E4-469E-644E-9952-CB69E8EF64CD}" type="slidenum">
+              <a:rPr lang="en-US" smtClean="0"/>
+              <a:pPr/>
+              <a:t>20</a:t>
+            </a:fld>
+            <a:endParaRPr lang="en-US"/>
+          </a:p>
+        </p:txBody>
+      </p:sp>
+      <p:sp>
+        <p:nvSpPr>
+          <p:cNvPr id="5" name="Footer Placeholder 4"/>
+          <p:cNvSpPr>
+            <a:spLocks noGrp="1"/>
+          </p:cNvSpPr>
+          <p:nvPr>
+            <p:ph type="ftr" sz="quarter" idx="11"/>
+          </p:nvPr>
+        </p:nvSpPr>
+        <p:spPr/>
+        <p:txBody>
+          <a:bodyPr/>
+          <a:lstStyle/>
+          <a:p>
+            <a:r>
+              <a:rPr lang="en-US"/>
+              <a:t>Chapter 12 Safety Engineering</a:t>
+            </a:r>
+          </a:p>
+        </p:txBody>
+      </p:sp>
+      <p:sp>
+        <p:nvSpPr>
+          <p:cNvPr id="2" name="Date Placeholder 1"/>
+          <p:cNvSpPr>
+            <a:spLocks noGrp="1"/>
+          </p:cNvSpPr>
+          <p:nvPr>
+            <p:ph type="dt" sz="half" idx="10"/>
+          </p:nvPr>
+        </p:nvSpPr>
+        <p:spPr/>
+        <p:txBody>
+          <a:bodyPr/>
+          <a:lstStyle/>
+          <a:p>
+            <a:r>
+              <a:rPr lang="en-GB"/>
+              <a:t>04/11/2014</a:t>
+            </a:r>
+            <a:endParaRPr lang="en-US"/>
+          </a:p>
+        </p:txBody>
+      </p:sp>
+    </p:spTree>
+    <p:extLst>
+      <p:ext uri="{BB962C8B-B14F-4D97-AF65-F5344CB8AC3E}">
+        <p14:creationId xmlns:p14="http://schemas.microsoft.com/office/powerpoint/2010/main" val="3877483119"/>
+      </p:ext>
+    </p:extLst>
+  </p:cSld>
+  <p:clrMapOvr>
+    <a:masterClrMapping/>
+  </p:clrMapOvr>
+</p:sld>
+</file>
+
+<file path=ppt/slides/slide21.xml><?xml version="1.0" encoding="utf-8"?>
+<p:sld xmlns:a="http://schemas.openxmlformats.org/drawingml/2006/main" xmlns:r="http://schemas.openxmlformats.org/officeDocument/2006/relationships" xmlns:p="http://schemas.openxmlformats.org/presentationml/2006/main">
+  <p:cSld>
+    <p:spTree>
+      <p:nvGrpSpPr>
+        <p:cNvPr id="1" name=""/>
+        <p:cNvGrpSpPr/>
+        <p:nvPr/>
+      </p:nvGrpSpPr>
+      <p:grpSpPr>
+        <a:xfrm>
+          <a:off x="0" y="0"/>
+          <a:ext cx="0" cy="0"/>
+          <a:chOff x="0" y="0"/>
+          <a:chExt cx="0" cy="0"/>
+        </a:xfrm>
+      </p:grpSpPr>
+      <p:sp>
+        <p:nvSpPr>
+          <p:cNvPr id="2" name="Title 1"/>
+          <p:cNvSpPr>
+            <a:spLocks noGrp="1"/>
+          </p:cNvSpPr>
+          <p:nvPr>
+            <p:ph type="title"/>
+          </p:nvPr>
+        </p:nvSpPr>
+        <p:spPr/>
+        <p:txBody>
+          <a:bodyPr/>
+          <a:lstStyle/>
+          <a:p>
+            <a:r>
+              <a:rPr lang="en-US" dirty="0"/>
+              <a:t>Examples of safety requirements</a:t>
+            </a:r>
+            <a:r>
+              <a:rPr lang="en-GB" dirty="0"/>
+              <a:t> </a:t>
+            </a:r>
+            <a:endParaRPr lang="en-US" dirty="0"/>
+          </a:p>
+        </p:txBody>
+      </p:sp>
+      <p:sp>
+        <p:nvSpPr>
+          <p:cNvPr id="4" name="TextBox 3"/>
+          <p:cNvSpPr txBox="1"/>
+          <p:nvPr/>
+        </p:nvSpPr>
+        <p:spPr>
+          <a:xfrm>
+            <a:off x="2148660" y="1898120"/>
+            <a:ext cx="7713962" cy="4431983"/>
+          </a:xfrm>
+          <a:prstGeom prst="rect">
+            <a:avLst/>
+          </a:prstGeom>
+          <a:solidFill>
+            <a:srgbClr val="FFFF00">
+              <a:alpha val="35000"/>
+            </a:srgbClr>
+          </a:solidFill>
+        </p:spPr>
+        <p:txBody>
+          <a:bodyPr wrap="square" rtlCol="0">
+            <a:spAutoFit/>
+          </a:bodyPr>
+          <a:lstStyle/>
+          <a:p>
+            <a:pPr>
+              <a:spcAft>
+                <a:spcPts val="600"/>
+              </a:spcAft>
+            </a:pPr>
+            <a:r>
+              <a:rPr lang="en-GB" b="1" dirty="0"/>
+              <a:t>SR1</a:t>
+            </a:r>
+            <a:r>
+              <a:rPr lang="en-GB" dirty="0"/>
+              <a:t>: The system shall not deliver a single dose of insulin that is greater than a specified maximum dose for a system user.</a:t>
+            </a:r>
+          </a:p>
+          <a:p>
+            <a:pPr>
+              <a:spcAft>
+                <a:spcPts val="600"/>
+              </a:spcAft>
+            </a:pPr>
+            <a:r>
+              <a:rPr lang="en-GB" b="1" dirty="0"/>
+              <a:t>SR2</a:t>
+            </a:r>
+            <a:r>
+              <a:rPr lang="en-GB" dirty="0"/>
+              <a:t>: The system shall not deliver a daily cumulative dose of insulin that is greater than a specified maximum daily dose for a system user.</a:t>
+            </a:r>
+          </a:p>
+          <a:p>
+            <a:pPr>
+              <a:spcAft>
+                <a:spcPts val="600"/>
+              </a:spcAft>
+            </a:pPr>
+            <a:r>
+              <a:rPr lang="en-GB" b="1" dirty="0"/>
+              <a:t>SR3</a:t>
+            </a:r>
+            <a:r>
+              <a:rPr lang="en-GB" dirty="0"/>
+              <a:t>: The system shall include a hardware diagnostic facility that shall be executed at least four times per hour.</a:t>
+            </a:r>
+          </a:p>
+          <a:p>
+            <a:pPr>
+              <a:spcAft>
+                <a:spcPts val="600"/>
+              </a:spcAft>
+            </a:pPr>
+            <a:r>
+              <a:rPr lang="en-GB" b="1" dirty="0"/>
+              <a:t>SR4</a:t>
+            </a:r>
+            <a:r>
+              <a:rPr lang="en-GB" dirty="0"/>
+              <a:t>: The system shall include an exception handler for all of the exceptions that are identified in Table 3.</a:t>
+            </a:r>
+          </a:p>
+          <a:p>
+            <a:pPr>
+              <a:spcAft>
+                <a:spcPts val="600"/>
+              </a:spcAft>
+            </a:pPr>
+            <a:r>
+              <a:rPr lang="en-GB" b="1" dirty="0"/>
+              <a:t>SR5</a:t>
+            </a:r>
+            <a:r>
+              <a:rPr lang="en-GB" dirty="0"/>
+              <a:t>: The audible alarm shall be sounded when any hardware or software anomaly is discovered and a diagnostic message, as defined in Table 4, shall be displayed.</a:t>
+            </a:r>
+          </a:p>
+          <a:p>
+            <a:pPr>
+              <a:spcAft>
+                <a:spcPts val="600"/>
+              </a:spcAft>
+            </a:pPr>
+            <a:r>
+              <a:rPr lang="en-GB" b="1" dirty="0"/>
+              <a:t>SR6</a:t>
+            </a:r>
+            <a:r>
+              <a:rPr lang="en-GB" dirty="0"/>
+              <a:t>: In the event of an alarm, insulin delivery shall be suspended until the user has reset the system and cleared the alarm.</a:t>
+            </a:r>
+          </a:p>
+          <a:p>
+            <a:endParaRPr lang="en-US" dirty="0"/>
+          </a:p>
+        </p:txBody>
+      </p:sp>
+      <p:sp>
+        <p:nvSpPr>
+          <p:cNvPr id="5" name="Slide Number Placeholder 4"/>
+          <p:cNvSpPr>
+            <a:spLocks noGrp="1"/>
+          </p:cNvSpPr>
+          <p:nvPr>
+            <p:ph type="sldNum" sz="quarter" idx="12"/>
+          </p:nvPr>
+        </p:nvSpPr>
+        <p:spPr/>
+        <p:txBody>
+          <a:bodyPr/>
+          <a:lstStyle/>
+          <a:p>
+            <a:fld id="{348D88E4-469E-644E-9952-CB69E8EF64CD}" type="slidenum">
+              <a:rPr lang="en-US" smtClean="0"/>
+              <a:pPr/>
+              <a:t>21</a:t>
+            </a:fld>
+            <a:endParaRPr lang="en-US"/>
+          </a:p>
+        </p:txBody>
+      </p:sp>
+      <p:sp>
+        <p:nvSpPr>
+          <p:cNvPr id="6" name="Footer Placeholder 5"/>
+          <p:cNvSpPr>
+            <a:spLocks noGrp="1"/>
+          </p:cNvSpPr>
+          <p:nvPr>
+            <p:ph type="ftr" sz="quarter" idx="11"/>
+          </p:nvPr>
+        </p:nvSpPr>
+        <p:spPr/>
+        <p:txBody>
+          <a:bodyPr/>
+          <a:lstStyle/>
+          <a:p>
+            <a:r>
+              <a:rPr lang="en-US"/>
+              <a:t>Chapter 12 Safety Engineering</a:t>
+            </a:r>
+          </a:p>
+        </p:txBody>
+      </p:sp>
+      <p:sp>
+        <p:nvSpPr>
+          <p:cNvPr id="3" name="Date Placeholder 2"/>
+          <p:cNvSpPr>
+            <a:spLocks noGrp="1"/>
+          </p:cNvSpPr>
+          <p:nvPr>
+            <p:ph type="dt" sz="half" idx="10"/>
+          </p:nvPr>
+        </p:nvSpPr>
+        <p:spPr/>
+        <p:txBody>
+          <a:bodyPr/>
+          <a:lstStyle/>
+          <a:p>
+            <a:r>
+              <a:rPr lang="en-GB"/>
+              <a:t>04/11/2014</a:t>
+            </a:r>
+            <a:endParaRPr lang="en-US"/>
+          </a:p>
+        </p:txBody>
+      </p:sp>
+    </p:spTree>
+    <p:extLst>
+      <p:ext uri="{BB962C8B-B14F-4D97-AF65-F5344CB8AC3E}">
+        <p14:creationId xmlns:p14="http://schemas.microsoft.com/office/powerpoint/2010/main" val="3311877693"/>
       </p:ext>
     </p:extLst>
   </p:cSld>
@@ -6616,7 +7597,7 @@
           <a:p>
             <a:r>
               <a:rPr lang="en-US" dirty="0"/>
-              <a:t>Hazard-driven analysis</a:t>
+              <a:t>Software in safety-critical systems</a:t>
             </a:r>
           </a:p>
         </p:txBody>
@@ -6637,29 +7618,15 @@
           <a:lstStyle/>
           <a:p>
             <a:r>
-              <a:rPr lang="en-US" dirty="0"/>
-              <a:t>Hazard identification</a:t>
-            </a:r>
-          </a:p>
-          <a:p>
-            <a:r>
-              <a:rPr lang="en-US" dirty="0"/>
-              <a:t>Hazard assessment</a:t>
-            </a:r>
-          </a:p>
-          <a:p>
-            <a:r>
-              <a:rPr lang="en-US" dirty="0"/>
-              <a:t>Hazard analysis</a:t>
-            </a:r>
-          </a:p>
-          <a:p>
-            <a:r>
-              <a:rPr lang="en-US" dirty="0"/>
-              <a:t>Safety requirements specification</a:t>
-            </a:r>
-          </a:p>
-          <a:p>
+              <a:rPr lang="en-GB" dirty="0"/>
+              <a:t>The system may be software-controlled so that the decisions made by the software and subsequent actions are safety-critical. Therefore, the software behaviour is directly related to the overall safety of the system. </a:t>
+            </a:r>
+          </a:p>
+          <a:p>
+            <a:r>
+              <a:rPr lang="en-GB" dirty="0"/>
+              <a:t>Software is extensively used for checking and monitoring other safety-critical components in a system. For example, all aircraft engine components are monitored by software looking for early indications of component failure. This software is safety-critical because, if it fails, other components may fail and cause an accident. </a:t>
+            </a:r>
             <a:endParaRPr lang="en-US" dirty="0"/>
           </a:p>
         </p:txBody>
@@ -6735,7 +7702,7 @@
     </p:spTree>
     <p:extLst>
       <p:ext uri="{BB962C8B-B14F-4D97-AF65-F5344CB8AC3E}">
-        <p14:creationId xmlns:p14="http://schemas.microsoft.com/office/powerpoint/2010/main" val="1458806048"/>
+        <p14:creationId xmlns:p14="http://schemas.microsoft.com/office/powerpoint/2010/main" val="2491176381"/>
       </p:ext>
     </p:extLst>
   </p:cSld>
@@ -6764,7 +7731,7 @@
       </p:grpSpPr>
       <p:sp>
         <p:nvSpPr>
-          <p:cNvPr id="154626" name="Rectangle 2"/>
+          <p:cNvPr id="22531" name="Rectangle 3"/>
           <p:cNvSpPr>
             <a:spLocks noGrp="1" noChangeArrowheads="1"/>
           </p:cNvSpPr>
@@ -6772,84 +7739,113 @@
             <p:ph type="title"/>
           </p:nvPr>
         </p:nvSpPr>
-        <p:spPr/>
-        <p:txBody>
-          <a:bodyPr/>
-          <a:lstStyle/>
-          <a:p>
-            <a:r>
-              <a:rPr lang="en-US" dirty="0"/>
-              <a:t>Hazard identification</a:t>
-            </a:r>
-          </a:p>
-        </p:txBody>
-      </p:sp>
-      <p:sp>
-        <p:nvSpPr>
-          <p:cNvPr id="5" name="Content Placeholder 4"/>
-          <p:cNvSpPr>
-            <a:spLocks noGrp="1"/>
+        <p:spPr>
+          <a:noFill/>
+          <a:ln/>
+        </p:spPr>
+        <p:txBody>
+          <a:bodyPr vert="horz" lIns="90487" tIns="44450" rIns="90487" bIns="44450" rtlCol="0" anchor="ctr">
+            <a:normAutofit/>
+          </a:bodyPr>
+          <a:lstStyle/>
+          <a:p>
+            <a:r>
+              <a:rPr lang="en-GB"/>
+              <a:t>Safety and reliability</a:t>
+            </a:r>
+          </a:p>
+        </p:txBody>
+      </p:sp>
+      <p:sp>
+        <p:nvSpPr>
+          <p:cNvPr id="22530" name="Rectangle 2"/>
+          <p:cNvSpPr>
+            <a:spLocks noGrp="1" noChangeArrowheads="1"/>
           </p:cNvSpPr>
           <p:nvPr>
             <p:ph idx="1"/>
           </p:nvPr>
         </p:nvSpPr>
-        <p:spPr/>
-        <p:txBody>
-          <a:bodyPr/>
-          <a:lstStyle/>
-          <a:p>
-            <a:r>
-              <a:rPr lang="en-US" dirty="0"/>
-              <a:t>Identify the hazards that may threaten the system.</a:t>
-            </a:r>
-          </a:p>
-          <a:p>
-            <a:r>
-              <a:rPr lang="en-US" dirty="0"/>
-              <a:t>Hazard identification may be based on different types of hazard:</a:t>
-            </a:r>
-          </a:p>
-          <a:p>
-            <a:pPr lvl="1"/>
-            <a:r>
-              <a:rPr lang="en-US" dirty="0"/>
-              <a:t>Physical hazards</a:t>
-            </a:r>
-          </a:p>
-          <a:p>
-            <a:pPr lvl="1"/>
-            <a:r>
-              <a:rPr lang="en-US" dirty="0"/>
-              <a:t>Electrical hazards</a:t>
-            </a:r>
-          </a:p>
-          <a:p>
-            <a:pPr lvl="1"/>
-            <a:r>
-              <a:rPr lang="en-US" dirty="0"/>
-              <a:t>Biological hazards</a:t>
-            </a:r>
-          </a:p>
-          <a:p>
-            <a:pPr lvl="1"/>
-            <a:r>
-              <a:rPr lang="en-US" dirty="0"/>
-              <a:t>Service failure hazards</a:t>
-            </a:r>
-          </a:p>
-          <a:p>
-            <a:pPr lvl="1"/>
-            <a:r>
-              <a:rPr lang="en-US" dirty="0"/>
-              <a:t>Etc.</a:t>
-            </a:r>
-          </a:p>
-        </p:txBody>
-      </p:sp>
-      <p:sp>
-        <p:nvSpPr>
-          <p:cNvPr id="6" name="Slide Number Placeholder 5"/>
+        <p:spPr>
+          <a:noFill/>
+          <a:ln/>
+        </p:spPr>
+        <p:txBody>
+          <a:bodyPr vert="horz" lIns="90487" tIns="44450" rIns="90487" bIns="44450" rtlCol="0">
+            <a:normAutofit/>
+          </a:bodyPr>
+          <a:lstStyle/>
+          <a:p>
+            <a:pPr>
+              <a:lnSpc>
+                <a:spcPct val="90000"/>
+              </a:lnSpc>
+            </a:pPr>
+            <a:r>
+              <a:rPr lang="en-GB" dirty="0"/>
+              <a:t>Safety and reliability are related but distinct</a:t>
+            </a:r>
+          </a:p>
+          <a:p>
+            <a:pPr lvl="1">
+              <a:lnSpc>
+                <a:spcPct val="90000"/>
+              </a:lnSpc>
+            </a:pPr>
+            <a:r>
+              <a:rPr lang="en-GB" dirty="0"/>
+              <a:t>In general, reliability and availability are necessary but not sufficient conditions for system safety </a:t>
+            </a:r>
+          </a:p>
+          <a:p>
+            <a:pPr>
+              <a:lnSpc>
+                <a:spcPct val="90000"/>
+              </a:lnSpc>
+            </a:pPr>
+            <a:r>
+              <a:rPr lang="en-GB" dirty="0"/>
+              <a:t>Reliability is concerned with conformance to a given specification and delivery of service</a:t>
+            </a:r>
+          </a:p>
+          <a:p>
+            <a:pPr>
+              <a:lnSpc>
+                <a:spcPct val="90000"/>
+              </a:lnSpc>
+            </a:pPr>
+            <a:r>
+              <a:rPr lang="en-GB" dirty="0"/>
+              <a:t>Safety is concerned with ensuring system cannot cause damage irrespective of whether or not it conforms to its specification.</a:t>
+            </a:r>
+          </a:p>
+          <a:p>
+            <a:pPr lvl="1">
+              <a:lnSpc>
+                <a:spcPct val="90000"/>
+              </a:lnSpc>
+            </a:pPr>
+            <a:r>
+              <a:rPr lang="en-GB" dirty="0"/>
+              <a:t>System reliability is essential for safety but is not enough</a:t>
+            </a:r>
+          </a:p>
+          <a:p>
+            <a:pPr lvl="1">
+              <a:lnSpc>
+                <a:spcPct val="90000"/>
+              </a:lnSpc>
+            </a:pPr>
+            <a:r>
+              <a:rPr lang="en-GB" dirty="0"/>
+              <a:t>Reliable systems can be unsafe</a:t>
+            </a:r>
+          </a:p>
+        </p:txBody>
+      </p:sp>
+      <p:sp>
+        <p:nvSpPr>
+          <p:cNvPr id="4" name="Slide Number Placeholder 3"/>
           <p:cNvSpPr>
             <a:spLocks noGrp="1"/>
           </p:cNvSpPr>
@@ -6862,7 +7858,7 @@
           <a:bodyPr/>
           <a:lstStyle/>
           <a:p>
-            <a:fld id="{348D88E4-469E-644E-9952-CB69E8EF64CD}" type="slidenum">
+            <a:fld id="{745CE82A-87C3-2841-AAF3-37DF1E34DC62}" type="slidenum">
               <a:rPr lang="en-US" smtClean="0"/>
               <a:pPr/>
               <a:t>4</a:t>
@@ -6873,7 +7869,7 @@
       </p:sp>
       <p:sp>
         <p:nvSpPr>
-          <p:cNvPr id="7" name="Footer Placeholder 6"/>
+          <p:cNvPr id="5" name="Footer Placeholder 4"/>
           <p:cNvSpPr>
             <a:spLocks noGrp="1"/>
           </p:cNvSpPr>
@@ -6919,13 +7915,14 @@
     </p:spTree>
     <p:extLst>
       <p:ext uri="{BB962C8B-B14F-4D97-AF65-F5344CB8AC3E}">
-        <p14:creationId xmlns:p14="http://schemas.microsoft.com/office/powerpoint/2010/main" val="459903958"/>
+        <p14:creationId xmlns:p14="http://schemas.microsoft.com/office/powerpoint/2010/main" val="2368722576"/>
       </p:ext>
     </p:extLst>
   </p:cSld>
   <p:clrMapOvr>
     <a:masterClrMapping/>
   </p:clrMapOvr>
+  <p:transition/>
 </p:sld>
 </file>
 
@@ -6948,9 +7945,9 @@
       </p:grpSpPr>
       <p:sp>
         <p:nvSpPr>
-          <p:cNvPr id="158722" name="Rectangle 2"/>
-          <p:cNvSpPr>
-            <a:spLocks noGrp="1" noChangeArrowheads="1"/>
+          <p:cNvPr id="2" name="Title 1"/>
+          <p:cNvSpPr>
+            <a:spLocks noGrp="1"/>
           </p:cNvSpPr>
           <p:nvPr>
             <p:ph type="title"/>
@@ -6962,17 +7959,17 @@
           <a:lstStyle/>
           <a:p>
             <a:r>
-              <a:rPr lang="en-US"/>
-              <a:t>Insulin pump risks</a:t>
-            </a:r>
-          </a:p>
-        </p:txBody>
-      </p:sp>
-      <p:sp>
-        <p:nvSpPr>
-          <p:cNvPr id="158723" name="Rectangle 3"/>
-          <p:cNvSpPr>
-            <a:spLocks noGrp="1" noChangeArrowheads="1"/>
+              <a:rPr lang="en-US" dirty="0"/>
+              <a:t>Safety specification</a:t>
+            </a:r>
+          </a:p>
+        </p:txBody>
+      </p:sp>
+      <p:sp>
+        <p:nvSpPr>
+          <p:cNvPr id="3" name="Content Placeholder 2"/>
+          <p:cNvSpPr>
+            <a:spLocks noGrp="1"/>
           </p:cNvSpPr>
           <p:nvPr>
             <p:ph idx="1"/>
@@ -6983,91 +7980,35 @@
           <a:bodyPr/>
           <a:lstStyle/>
           <a:p>
-            <a:pPr>
-              <a:lnSpc>
-                <a:spcPct val="90000"/>
-              </a:lnSpc>
-            </a:pPr>
-            <a:r>
-              <a:rPr lang="en-US" sz="2400"/>
-              <a:t>Insulin overdose (service failure).</a:t>
-            </a:r>
-          </a:p>
-          <a:p>
-            <a:pPr>
-              <a:lnSpc>
-                <a:spcPct val="90000"/>
-              </a:lnSpc>
-            </a:pPr>
-            <a:r>
-              <a:rPr lang="en-US" sz="2400"/>
-              <a:t>Insulin underdose (service failure).</a:t>
-            </a:r>
-          </a:p>
-          <a:p>
-            <a:pPr>
-              <a:lnSpc>
-                <a:spcPct val="90000"/>
-              </a:lnSpc>
-            </a:pPr>
-            <a:r>
-              <a:rPr lang="en-US" sz="2400"/>
-              <a:t>Power failure due to exhausted battery (electrical).</a:t>
-            </a:r>
-          </a:p>
-          <a:p>
-            <a:pPr>
-              <a:lnSpc>
-                <a:spcPct val="90000"/>
-              </a:lnSpc>
-            </a:pPr>
-            <a:r>
-              <a:rPr lang="en-US" sz="2400"/>
-              <a:t>Electrical interference with other medical equipment (electrical).</a:t>
-            </a:r>
-          </a:p>
-          <a:p>
-            <a:pPr>
-              <a:lnSpc>
-                <a:spcPct val="90000"/>
-              </a:lnSpc>
-            </a:pPr>
-            <a:r>
-              <a:rPr lang="en-US" sz="2400"/>
-              <a:t>Poor sensor and actuator contact (physical).</a:t>
-            </a:r>
-          </a:p>
-          <a:p>
-            <a:pPr>
-              <a:lnSpc>
-                <a:spcPct val="90000"/>
-              </a:lnSpc>
-            </a:pPr>
-            <a:r>
-              <a:rPr lang="en-US" sz="2400"/>
-              <a:t>Parts of machine break off in body (physical).</a:t>
-            </a:r>
-          </a:p>
-          <a:p>
-            <a:pPr>
-              <a:lnSpc>
-                <a:spcPct val="90000"/>
-              </a:lnSpc>
-            </a:pPr>
-            <a:r>
-              <a:rPr lang="en-US" sz="2400"/>
-              <a:t>Infection caused by introduction of machine (biological).</a:t>
-            </a:r>
-          </a:p>
-          <a:p>
-            <a:pPr>
-              <a:lnSpc>
-                <a:spcPct val="90000"/>
-              </a:lnSpc>
-            </a:pPr>
-            <a:r>
-              <a:rPr lang="en-US" sz="2400"/>
-              <a:t>Allergic reaction to materials or insulin (biological).</a:t>
+            <a:r>
+              <a:rPr lang="en-US" dirty="0"/>
+              <a:t>The goal of safety requirements engineering is to identify protection requirements that ensure that system failures do not cause injury or death or environmental damage.</a:t>
+            </a:r>
+          </a:p>
+          <a:p>
+            <a:r>
+              <a:rPr lang="en-US" dirty="0"/>
+              <a:t>Safety requirements may be ‘shall not’ requirements i.e. they define situations and events that should never occur.</a:t>
+            </a:r>
+          </a:p>
+          <a:p>
+            <a:r>
+              <a:rPr lang="en-US" dirty="0"/>
+              <a:t>Functional safety requirements define:</a:t>
+            </a:r>
+          </a:p>
+          <a:p>
+            <a:pPr lvl="1"/>
+            <a:r>
+              <a:rPr lang="en-US" dirty="0"/>
+              <a:t>Checking and recovery features that should be included in a system</a:t>
+            </a:r>
+          </a:p>
+          <a:p>
+            <a:pPr lvl="1"/>
+            <a:r>
+              <a:rPr lang="en-US" dirty="0"/>
+              <a:t>Features that provide protection against system failures and external attacks</a:t>
             </a:r>
           </a:p>
         </p:txBody>
@@ -7120,7 +8061,7 @@
       </p:sp>
       <p:sp>
         <p:nvSpPr>
-          <p:cNvPr id="2" name="Date Placeholder 1"/>
+          <p:cNvPr id="6" name="Date Placeholder 5"/>
           <p:cNvSpPr>
             <a:spLocks noGrp="1"/>
           </p:cNvSpPr>
@@ -7144,7 +8085,7 @@
     </p:spTree>
     <p:extLst>
       <p:ext uri="{BB962C8B-B14F-4D97-AF65-F5344CB8AC3E}">
-        <p14:creationId xmlns:p14="http://schemas.microsoft.com/office/powerpoint/2010/main" val="1570831662"/>
+        <p14:creationId xmlns:p14="http://schemas.microsoft.com/office/powerpoint/2010/main" val="3822513494"/>
       </p:ext>
     </p:extLst>
   </p:cSld>
@@ -7173,9 +8114,9 @@
       </p:grpSpPr>
       <p:sp>
         <p:nvSpPr>
-          <p:cNvPr id="155650" name="Rectangle 2"/>
-          <p:cNvSpPr>
-            <a:spLocks noGrp="1" noChangeArrowheads="1"/>
+          <p:cNvPr id="2" name="Title 1"/>
+          <p:cNvSpPr>
+            <a:spLocks noGrp="1"/>
           </p:cNvSpPr>
           <p:nvPr>
             <p:ph type="title"/>
@@ -7185,113 +8126,105 @@
         <p:txBody>
           <a:bodyPr/>
           <a:lstStyle/>
+          <a:p>
+            <a:r>
+              <a:rPr lang="en-US" dirty="0"/>
+              <a:t>Hazard-driven analysis</a:t>
+            </a:r>
+          </a:p>
+        </p:txBody>
+      </p:sp>
+      <p:sp>
+        <p:nvSpPr>
+          <p:cNvPr id="3" name="Content Placeholder 2"/>
+          <p:cNvSpPr>
+            <a:spLocks noGrp="1"/>
+          </p:cNvSpPr>
+          <p:nvPr>
+            <p:ph idx="1"/>
+          </p:nvPr>
+        </p:nvSpPr>
+        <p:spPr/>
+        <p:txBody>
+          <a:bodyPr/>
+          <a:lstStyle/>
+          <a:p>
+            <a:r>
+              <a:rPr lang="en-US" dirty="0"/>
+              <a:t>Hazard identification</a:t>
+            </a:r>
+          </a:p>
           <a:p>
             <a:r>
               <a:rPr lang="en-US" dirty="0"/>
               <a:t>Hazard assessment</a:t>
             </a:r>
           </a:p>
-        </p:txBody>
-      </p:sp>
-      <p:sp>
-        <p:nvSpPr>
-          <p:cNvPr id="155651" name="Rectangle 3"/>
-          <p:cNvSpPr>
-            <a:spLocks noGrp="1" noChangeArrowheads="1"/>
-          </p:cNvSpPr>
-          <p:nvPr>
-            <p:ph idx="1"/>
-          </p:nvPr>
-        </p:nvSpPr>
-        <p:spPr/>
-        <p:txBody>
-          <a:bodyPr/>
-          <a:lstStyle/>
-          <a:p>
-            <a:pPr>
-              <a:lnSpc>
-                <a:spcPct val="90000"/>
-              </a:lnSpc>
-            </a:pPr>
-            <a:r>
-              <a:rPr lang="en-US"/>
-              <a:t>The process is concerned with understanding the likelihood that a risk will arise and the potential consequences if an accident or incident should occur.</a:t>
-            </a:r>
-          </a:p>
-          <a:p>
-            <a:pPr>
-              <a:lnSpc>
-                <a:spcPct val="90000"/>
-              </a:lnSpc>
-            </a:pPr>
-            <a:r>
-              <a:rPr lang="en-US"/>
-              <a:t>Risks may be categorised as:</a:t>
-            </a:r>
-          </a:p>
-          <a:p>
-            <a:pPr lvl="1">
-              <a:lnSpc>
-                <a:spcPct val="90000"/>
-              </a:lnSpc>
-            </a:pPr>
-            <a:r>
-              <a:rPr lang="en-GB" sz="2000">
-                <a:solidFill>
-                  <a:schemeClr val="accent1"/>
-                </a:solidFill>
-              </a:rPr>
-              <a:t>Intolerable.</a:t>
-            </a:r>
-            <a:r>
-              <a:rPr lang="en-GB" sz="2000"/>
-              <a:t> Must never arise or result in an accident</a:t>
-            </a:r>
-          </a:p>
-          <a:p>
-            <a:pPr lvl="1">
-              <a:lnSpc>
-                <a:spcPct val="90000"/>
-              </a:lnSpc>
-            </a:pPr>
-            <a:r>
-              <a:rPr lang="en-GB" sz="2000">
-                <a:solidFill>
-                  <a:schemeClr val="accent1"/>
-                </a:solidFill>
-              </a:rPr>
-              <a:t>As low as reasonably practical(ALARP).</a:t>
-            </a:r>
-            <a:r>
-              <a:rPr lang="en-GB" sz="2000"/>
-              <a:t> Must minimise the possibility of risk given cost and schedule constraints</a:t>
-            </a:r>
-          </a:p>
-          <a:p>
-            <a:pPr lvl="1">
-              <a:lnSpc>
-                <a:spcPct val="90000"/>
-              </a:lnSpc>
-            </a:pPr>
-            <a:r>
-              <a:rPr lang="en-GB" sz="2000">
-                <a:solidFill>
-                  <a:schemeClr val="accent1"/>
-                </a:solidFill>
-              </a:rPr>
-              <a:t>Acceptable.</a:t>
-            </a:r>
-            <a:r>
-              <a:rPr lang="en-GB" sz="2000"/>
-              <a:t> The consequences of the risk are acceptable and no extra costs should be incurred to reduce hazard probability</a:t>
-            </a:r>
-            <a:endParaRPr lang="en-US" sz="2000"/>
-          </a:p>
-        </p:txBody>
-      </p:sp>
-      <p:sp>
-        <p:nvSpPr>
-          <p:cNvPr id="4" name="Slide Number Placeholder 3"/>
+          <a:p>
+            <a:r>
+              <a:rPr lang="en-US" dirty="0"/>
+              <a:t>Hazard analysis</a:t>
+            </a:r>
+          </a:p>
+          <a:p>
+            <a:r>
+              <a:rPr lang="en-US" dirty="0"/>
+              <a:t>Safety requirements specification</a:t>
+            </a:r>
+          </a:p>
+          <a:p>
+            <a:endParaRPr lang="en-US" dirty="0"/>
+          </a:p>
+        </p:txBody>
+      </p:sp>
+      <p:sp>
+        <p:nvSpPr>
+          <p:cNvPr id="4" name="Date Placeholder 3"/>
+          <p:cNvSpPr>
+            <a:spLocks noGrp="1"/>
+          </p:cNvSpPr>
+          <p:nvPr>
+            <p:ph type="dt" sz="half" idx="10"/>
+          </p:nvPr>
+        </p:nvSpPr>
+        <p:spPr/>
+        <p:txBody>
+          <a:bodyPr/>
+          <a:lstStyle/>
+          <a:p>
+            <a:r>
+              <a:rPr lang="en-GB"/>
+              <a:t>04/11/2014</a:t>
+            </a:r>
+            <a:endParaRPr lang="en-US"/>
+          </a:p>
+        </p:txBody>
+      </p:sp>
+      <p:sp>
+        <p:nvSpPr>
+          <p:cNvPr id="5" name="Footer Placeholder 4"/>
+          <p:cNvSpPr>
+            <a:spLocks noGrp="1"/>
+          </p:cNvSpPr>
+          <p:nvPr>
+            <p:ph type="ftr" sz="quarter" idx="11"/>
+          </p:nvPr>
+        </p:nvSpPr>
+        <p:spPr/>
+        <p:txBody>
+          <a:bodyPr/>
+          <a:lstStyle/>
+          <a:p>
+            <a:r>
+              <a:rPr lang="en-US"/>
+              <a:t>Chapter 12 Safety Engineering</a:t>
+            </a:r>
+          </a:p>
+        </p:txBody>
+      </p:sp>
+      <p:sp>
+        <p:nvSpPr>
+          <p:cNvPr id="6" name="Slide Number Placeholder 5"/>
           <p:cNvSpPr>
             <a:spLocks noGrp="1"/>
           </p:cNvSpPr>
@@ -7304,64 +8237,18 @@
           <a:bodyPr/>
           <a:lstStyle/>
           <a:p>
-            <a:fld id="{348D88E4-469E-644E-9952-CB69E8EF64CD}" type="slidenum">
+            <a:fld id="{D0885483-9D1B-B54E-9B37-F57DB5D598CD}" type="slidenum">
               <a:rPr lang="en-US" smtClean="0"/>
-              <a:pPr/>
               <a:t>6</a:t>
             </a:fld>
             <a:endParaRPr lang="en-US"/>
           </a:p>
         </p:txBody>
       </p:sp>
-      <p:sp>
-        <p:nvSpPr>
-          <p:cNvPr id="5" name="Footer Placeholder 4"/>
-          <p:cNvSpPr>
-            <a:spLocks noGrp="1"/>
-          </p:cNvSpPr>
-          <p:nvPr>
-            <p:ph type="ftr" sz="quarter" idx="11"/>
-          </p:nvPr>
-        </p:nvSpPr>
-        <p:spPr/>
-        <p:txBody>
-          <a:bodyPr/>
-          <a:lstStyle/>
-          <a:p>
-            <a:r>
-              <a:rPr lang="en-US"/>
-              <a:t>Chapter 12 Safety Engineering</a:t>
-            </a:r>
-          </a:p>
-        </p:txBody>
-      </p:sp>
-      <p:sp>
-        <p:nvSpPr>
-          <p:cNvPr id="2" name="Date Placeholder 1"/>
-          <p:cNvSpPr>
-            <a:spLocks noGrp="1"/>
-          </p:cNvSpPr>
-          <p:nvPr>
-            <p:ph type="dt" sz="half" idx="10"/>
-          </p:nvPr>
-        </p:nvSpPr>
-        <p:spPr/>
-        <p:txBody>
-          <a:bodyPr/>
-          <a:lstStyle/>
-          <a:p>
-            <a:r>
-              <a:rPr lang="en-GB"/>
-              <a:t>04/11/2014</a:t>
-            </a:r>
-            <a:endParaRPr lang="en-US"/>
-          </a:p>
-        </p:txBody>
-      </p:sp>
     </p:spTree>
     <p:extLst>
       <p:ext uri="{BB962C8B-B14F-4D97-AF65-F5344CB8AC3E}">
-        <p14:creationId xmlns:p14="http://schemas.microsoft.com/office/powerpoint/2010/main" val="243841729"/>
+        <p14:creationId xmlns:p14="http://schemas.microsoft.com/office/powerpoint/2010/main" val="1458806048"/>
       </p:ext>
     </p:extLst>
   </p:cSld>
@@ -7390,9 +8277,9 @@
       </p:grpSpPr>
       <p:sp>
         <p:nvSpPr>
-          <p:cNvPr id="2" name="Title 1"/>
-          <p:cNvSpPr>
-            <a:spLocks noGrp="1"/>
+          <p:cNvPr id="154626" name="Rectangle 2"/>
+          <p:cNvSpPr>
+            <a:spLocks noGrp="1" noChangeArrowheads="1"/>
           </p:cNvSpPr>
           <p:nvPr>
             <p:ph type="title"/>
@@ -7405,43 +8292,77 @@
           <a:p>
             <a:r>
               <a:rPr lang="en-US" dirty="0"/>
-              <a:t>The risk triangle</a:t>
-            </a:r>
-            <a:r>
-              <a:rPr lang="en-GB" dirty="0"/>
-              <a:t> </a:t>
-            </a:r>
-            <a:endParaRPr lang="en-US" dirty="0"/>
-          </a:p>
-        </p:txBody>
-      </p:sp>
-      <p:pic>
-        <p:nvPicPr>
-          <p:cNvPr id="4" name="Content Placeholder 3" descr="12.2 RiskTriangle.eps"/>
-          <p:cNvPicPr>
-            <a:picLocks noGrp="1" noChangeAspect="1"/>
-          </p:cNvPicPr>
+              <a:t>Hazard identification</a:t>
+            </a:r>
+          </a:p>
+        </p:txBody>
+      </p:sp>
+      <p:sp>
+        <p:nvSpPr>
+          <p:cNvPr id="5" name="Content Placeholder 4"/>
+          <p:cNvSpPr>
+            <a:spLocks noGrp="1"/>
+          </p:cNvSpPr>
           <p:nvPr>
             <p:ph idx="1"/>
           </p:nvPr>
-        </p:nvPicPr>
-        <p:blipFill>
-          <a:blip r:embed="rId2"/>
-          <a:srcRect l="-21258" r="-21258"/>
-          <a:stretch>
-            <a:fillRect/>
-          </a:stretch>
-        </p:blipFill>
-        <p:spPr>
-          <a:xfrm>
-            <a:off x="3113831" y="2080761"/>
-            <a:ext cx="6452568" cy="3548664"/>
-          </a:xfrm>
-        </p:spPr>
-      </p:pic>
-      <p:sp>
-        <p:nvSpPr>
-          <p:cNvPr id="5" name="Slide Number Placeholder 4"/>
+        </p:nvSpPr>
+        <p:spPr/>
+        <p:txBody>
+          <a:bodyPr/>
+          <a:lstStyle/>
+          <a:p>
+            <a:r>
+              <a:rPr lang="en-US" dirty="0"/>
+              <a:t>Identify the hazards that may threaten the system.</a:t>
+            </a:r>
+          </a:p>
+          <a:p>
+            <a:r>
+              <a:rPr lang="en-US" dirty="0"/>
+              <a:t>Hazard identification may be based on different types of hazard:</a:t>
+            </a:r>
+          </a:p>
+          <a:p>
+            <a:pPr lvl="1"/>
+            <a:r>
+              <a:rPr lang="en-US" dirty="0"/>
+              <a:t>Physical hazards</a:t>
+            </a:r>
+          </a:p>
+          <a:p>
+            <a:pPr lvl="1"/>
+            <a:r>
+              <a:rPr lang="en-US" dirty="0"/>
+              <a:t>Electrical hazards</a:t>
+            </a:r>
+          </a:p>
+          <a:p>
+            <a:pPr lvl="1"/>
+            <a:r>
+              <a:rPr lang="en-US" dirty="0"/>
+              <a:t>Biological hazards</a:t>
+            </a:r>
+          </a:p>
+          <a:p>
+            <a:pPr lvl="1"/>
+            <a:r>
+              <a:rPr lang="en-US" dirty="0"/>
+              <a:t>Service failure hazards</a:t>
+            </a:r>
+          </a:p>
+          <a:p>
+            <a:pPr lvl="1"/>
+            <a:r>
+              <a:rPr lang="en-US" dirty="0"/>
+              <a:t>Etc.</a:t>
+            </a:r>
+          </a:p>
+        </p:txBody>
+      </p:sp>
+      <p:sp>
+        <p:nvSpPr>
+          <p:cNvPr id="6" name="Slide Number Placeholder 5"/>
           <p:cNvSpPr>
             <a:spLocks noGrp="1"/>
           </p:cNvSpPr>
@@ -7465,7 +8386,7 @@
       </p:sp>
       <p:sp>
         <p:nvSpPr>
-          <p:cNvPr id="6" name="Footer Placeholder 5"/>
+          <p:cNvPr id="7" name="Footer Placeholder 6"/>
           <p:cNvSpPr>
             <a:spLocks noGrp="1"/>
           </p:cNvSpPr>
@@ -7487,7 +8408,7 @@
       </p:sp>
       <p:sp>
         <p:nvSpPr>
-          <p:cNvPr id="3" name="Date Placeholder 2"/>
+          <p:cNvPr id="2" name="Date Placeholder 1"/>
           <p:cNvSpPr>
             <a:spLocks noGrp="1"/>
           </p:cNvSpPr>
@@ -7511,7 +8432,7 @@
     </p:spTree>
     <p:extLst>
       <p:ext uri="{BB962C8B-B14F-4D97-AF65-F5344CB8AC3E}">
-        <p14:creationId xmlns:p14="http://schemas.microsoft.com/office/powerpoint/2010/main" val="1494197617"/>
+        <p14:creationId xmlns:p14="http://schemas.microsoft.com/office/powerpoint/2010/main" val="459903958"/>
       </p:ext>
     </p:extLst>
   </p:cSld>
@@ -7540,7 +8461,7 @@
       </p:grpSpPr>
       <p:sp>
         <p:nvSpPr>
-          <p:cNvPr id="159746" name="Rectangle 2"/>
+          <p:cNvPr id="158722" name="Rectangle 2"/>
           <p:cNvSpPr>
             <a:spLocks noGrp="1" noChangeArrowheads="1"/>
           </p:cNvSpPr>
@@ -7555,14 +8476,14 @@
           <a:p>
             <a:r>
               <a:rPr lang="en-US"/>
-              <a:t>Social acceptability of risk</a:t>
-            </a:r>
-          </a:p>
-        </p:txBody>
-      </p:sp>
-      <p:sp>
-        <p:nvSpPr>
-          <p:cNvPr id="159747" name="Rectangle 3"/>
+              <a:t>Insulin pump risks</a:t>
+            </a:r>
+          </a:p>
+        </p:txBody>
+      </p:sp>
+      <p:sp>
+        <p:nvSpPr>
+          <p:cNvPr id="158723" name="Rectangle 3"/>
           <p:cNvSpPr>
             <a:spLocks noGrp="1" noChangeArrowheads="1"/>
           </p:cNvSpPr>
@@ -7581,8 +8502,8 @@
               </a:lnSpc>
             </a:pPr>
             <a:r>
-              <a:rPr lang="en-GB" sz="2400"/>
-              <a:t>The acceptability of a risk is determined by human, social and political considerations.</a:t>
+              <a:rPr lang="en-US" sz="2400"/>
+              <a:t>Insulin overdose (service failure).</a:t>
             </a:r>
           </a:p>
           <a:p>
@@ -7592,19 +8513,8 @@
               </a:lnSpc>
             </a:pPr>
             <a:r>
-              <a:rPr lang="en-GB" sz="2400"/>
-              <a:t>In most societies, the boundaries between the regions are pushed upwards with time i.e. society is less willing to accept risk</a:t>
-            </a:r>
-          </a:p>
-          <a:p>
-            <a:pPr lvl="1">
-              <a:lnSpc>
-                <a:spcPct val="90000"/>
-              </a:lnSpc>
-            </a:pPr>
-            <a:r>
-              <a:rPr lang="en-GB" sz="2000"/>
-              <a:t>For example, the costs of cleaning up pollution may be less than the costs of preventing it but this may not be socially acceptable.</a:t>
+              <a:rPr lang="en-US" sz="2400"/>
+              <a:t>Insulin underdose (service failure).</a:t>
             </a:r>
           </a:p>
           <a:p>
@@ -7614,19 +8524,8 @@
               </a:lnSpc>
             </a:pPr>
             <a:r>
-              <a:rPr lang="en-GB" sz="2400"/>
-              <a:t>Risk assessment is subjective</a:t>
-            </a:r>
-          </a:p>
-          <a:p>
-            <a:pPr lvl="1">
-              <a:lnSpc>
-                <a:spcPct val="90000"/>
-              </a:lnSpc>
-            </a:pPr>
-            <a:r>
-              <a:rPr lang="en-GB" sz="2000"/>
-              <a:t>Risks are identified as probable, unlikely, etc. This depends on who is making the assessment.</a:t>
+              <a:rPr lang="en-US" sz="2400"/>
+              <a:t>Power failure due to exhausted battery (electrical).</a:t>
             </a:r>
           </a:p>
           <a:p>
@@ -7635,7 +8534,54 @@
                 <a:spcPct val="90000"/>
               </a:lnSpc>
             </a:pPr>
-            <a:endParaRPr lang="en-US" sz="2400"/>
+            <a:r>
+              <a:rPr lang="en-US" sz="2400"/>
+              <a:t>Electrical interference with other medical equipment (electrical).</a:t>
+            </a:r>
+          </a:p>
+          <a:p>
+            <a:pPr>
+              <a:lnSpc>
+                <a:spcPct val="90000"/>
+              </a:lnSpc>
+            </a:pPr>
+            <a:r>
+              <a:rPr lang="en-US" sz="2400"/>
+              <a:t>Poor sensor and actuator contact (physical).</a:t>
+            </a:r>
+          </a:p>
+          <a:p>
+            <a:pPr>
+              <a:lnSpc>
+                <a:spcPct val="90000"/>
+              </a:lnSpc>
+            </a:pPr>
+            <a:r>
+              <a:rPr lang="en-US" sz="2400"/>
+              <a:t>Parts of machine break off in body (physical).</a:t>
+            </a:r>
+          </a:p>
+          <a:p>
+            <a:pPr>
+              <a:lnSpc>
+                <a:spcPct val="90000"/>
+              </a:lnSpc>
+            </a:pPr>
+            <a:r>
+              <a:rPr lang="en-US" sz="2400"/>
+              <a:t>Infection caused by introduction of machine (biological).</a:t>
+            </a:r>
+          </a:p>
+          <a:p>
+            <a:pPr>
+              <a:lnSpc>
+                <a:spcPct val="90000"/>
+              </a:lnSpc>
+            </a:pPr>
+            <a:r>
+              <a:rPr lang="en-US" sz="2400"/>
+              <a:t>Allergic reaction to materials or insulin (biological).</a:t>
+            </a:r>
           </a:p>
         </p:txBody>
       </p:sp>
@@ -7711,7 +8657,7 @@
     </p:spTree>
     <p:extLst>
       <p:ext uri="{BB962C8B-B14F-4D97-AF65-F5344CB8AC3E}">
-        <p14:creationId xmlns:p14="http://schemas.microsoft.com/office/powerpoint/2010/main" val="616399947"/>
+        <p14:creationId xmlns:p14="http://schemas.microsoft.com/office/powerpoint/2010/main" val="1570831662"/>
       </p:ext>
     </p:extLst>
   </p:cSld>
@@ -7740,7 +8686,7 @@
       </p:grpSpPr>
       <p:sp>
         <p:nvSpPr>
-          <p:cNvPr id="161794" name="Rectangle 2"/>
+          <p:cNvPr id="155650" name="Rectangle 2"/>
           <p:cNvSpPr>
             <a:spLocks noGrp="1" noChangeArrowheads="1"/>
           </p:cNvSpPr>
@@ -7762,7 +8708,7 @@
       </p:sp>
       <p:sp>
         <p:nvSpPr>
-          <p:cNvPr id="161795" name="Rectangle 3"/>
+          <p:cNvPr id="155651" name="Rectangle 3"/>
           <p:cNvSpPr>
             <a:spLocks noGrp="1" noChangeArrowheads="1"/>
           </p:cNvSpPr>
@@ -7775,22 +8721,84 @@
           <a:bodyPr/>
           <a:lstStyle/>
           <a:p>
-            <a:r>
-              <a:rPr lang="en-US"/>
-              <a:t>Estimate the risk probability and the risk severity.</a:t>
-            </a:r>
-          </a:p>
-          <a:p>
-            <a:r>
-              <a:rPr lang="en-US"/>
-              <a:t>It is not normally possible to do this precisely so relative values are used such as ‘unlikely’, ‘rare’, ‘very high’, etc.</a:t>
-            </a:r>
-          </a:p>
-          <a:p>
-            <a:r>
-              <a:rPr lang="en-US"/>
-              <a:t>The aim must be to exclude risks that are likely to arise or that have high severity.</a:t>
-            </a:r>
+            <a:pPr>
+              <a:lnSpc>
+                <a:spcPct val="90000"/>
+              </a:lnSpc>
+            </a:pPr>
+            <a:r>
+              <a:rPr lang="en-US"/>
+              <a:t>The process is concerned with understanding the likelihood that a risk will arise and the potential consequences if an accident or incident should occur.</a:t>
+            </a:r>
+          </a:p>
+          <a:p>
+            <a:pPr>
+              <a:lnSpc>
+                <a:spcPct val="90000"/>
+              </a:lnSpc>
+            </a:pPr>
+            <a:r>
+              <a:rPr lang="en-US"/>
+              <a:t>Risks may be categorised as:</a:t>
+            </a:r>
+          </a:p>
+          <a:p>
+            <a:pPr lvl="1">
+              <a:lnSpc>
+                <a:spcPct val="90000"/>
+              </a:lnSpc>
+            </a:pPr>
+            <a:r>
+              <a:rPr lang="en-GB" sz="2000">
+                <a:solidFill>
+                  <a:schemeClr val="accent1"/>
+                </a:solidFill>
+              </a:rPr>
+              <a:t>Intolerable.</a:t>
+            </a:r>
+            <a:r>
+              <a:rPr lang="en-GB" sz="2000"/>
+              <a:t> Must never arise or result in an accident</a:t>
+            </a:r>
+          </a:p>
+          <a:p>
+            <a:pPr lvl="1">
+              <a:lnSpc>
+                <a:spcPct val="90000"/>
+              </a:lnSpc>
+            </a:pPr>
+            <a:r>
+              <a:rPr lang="en-GB" sz="2000">
+                <a:solidFill>
+                  <a:schemeClr val="accent1"/>
+                </a:solidFill>
+              </a:rPr>
+              <a:t>As low as reasonably practical(ALARP).</a:t>
+            </a:r>
+            <a:r>
+              <a:rPr lang="en-GB" sz="2000"/>
+              <a:t> Must minimise the possibility of risk given cost and schedule constraints</a:t>
+            </a:r>
+          </a:p>
+          <a:p>
+            <a:pPr lvl="1">
+              <a:lnSpc>
+                <a:spcPct val="90000"/>
+              </a:lnSpc>
+            </a:pPr>
+            <a:r>
+              <a:rPr lang="en-GB" sz="2000">
+                <a:solidFill>
+                  <a:schemeClr val="accent1"/>
+                </a:solidFill>
+              </a:rPr>
+              <a:t>Acceptable.</a:t>
+            </a:r>
+            <a:r>
+              <a:rPr lang="en-GB" sz="2000"/>
+              <a:t> The consequences of the risk are acceptable and no extra costs should be incurred to reduce hazard probability</a:t>
+            </a:r>
+            <a:endParaRPr lang="en-US" sz="2000"/>
           </a:p>
         </p:txBody>
       </p:sp>
@@ -7866,7 +8874,7 @@
     </p:spTree>
     <p:extLst>
       <p:ext uri="{BB962C8B-B14F-4D97-AF65-F5344CB8AC3E}">
-        <p14:creationId xmlns:p14="http://schemas.microsoft.com/office/powerpoint/2010/main" val="3867773449"/>
+        <p14:creationId xmlns:p14="http://schemas.microsoft.com/office/powerpoint/2010/main" val="243841729"/>
       </p:ext>
     </p:extLst>
   </p:cSld>
@@ -8169,4 +9177,299 @@
     </a:ext>
   </a:extLst>
 </a:theme>
+</file>
+
+<file path=ppt/theme/theme2.xml><?xml version="1.0" encoding="utf-8"?>
+<a:theme xmlns:a="http://schemas.openxmlformats.org/drawingml/2006/main" name="Office Theme">
+  <a:themeElements>
+    <a:clrScheme name="Office">
+      <a:dk1>
+        <a:sysClr val="windowText" lastClr="000000"/>
+      </a:dk1>
+      <a:lt1>
+        <a:sysClr val="window" lastClr="FFFFFF"/>
+      </a:lt1>
+      <a:dk2>
+        <a:srgbClr val="44546A"/>
+      </a:dk2>
+      <a:lt2>
+        <a:srgbClr val="E7E6E6"/>
+      </a:lt2>
+      <a:accent1>
+        <a:srgbClr val="4472C4"/>
+      </a:accent1>
+      <a:accent2>
+        <a:srgbClr val="ED7D31"/>
+      </a:accent2>
+      <a:accent3>
+        <a:srgbClr val="A5A5A5"/>
+      </a:accent3>
+      <a:accent4>
+        <a:srgbClr val="FFC000"/>
+      </a:accent4>
+      <a:accent5>
+        <a:srgbClr val="5B9BD5"/>
+      </a:accent5>
+      <a:accent6>
+        <a:srgbClr val="70AD47"/>
+      </a:accent6>
+      <a:hlink>
+        <a:srgbClr val="0563C1"/>
+      </a:hlink>
+      <a:folHlink>
+        <a:srgbClr val="954F72"/>
+      </a:folHlink>
+    </a:clrScheme>
+    <a:fontScheme name="Office">
+      <a:majorFont>
+        <a:latin typeface="Calibri Light" panose="020F0302020204030204"/>
+        <a:ea typeface=""/>
+        <a:cs typeface=""/>
+        <a:font script="Jpan" typeface="游ゴシック Light"/>
+        <a:font script="Hang" typeface="맑은 고딕"/>
+        <a:font script="Hans" typeface="等线 Light"/>
+        <a:font script="Hant" typeface="新細明體"/>
+        <a:font script="Arab" typeface="Times New Roman"/>
+        <a:font script="Hebr" typeface="Times New Roman"/>
+        <a:font script="Thai" typeface="Angsana New"/>
+        <a:font script="Ethi" typeface="Nyala"/>
+        <a:font script="Beng" typeface="Vrinda"/>
+        <a:font script="Gujr" typeface="Shruti"/>
+        <a:font script="Khmr" typeface="MoolBoran"/>
+        <a:font script="Knda" typeface="Tunga"/>
+        <a:font script="Guru" typeface="Raavi"/>
+        <a:font script="Cans" typeface="Euphemia"/>
+        <a:font script="Cher" typeface="Plantagenet Cherokee"/>
+        <a:font script="Yiii" typeface="Microsoft Yi Baiti"/>
+        <a:font script="Tibt" typeface="Microsoft Himalaya"/>
+        <a:font script="Thaa" typeface="MV Boli"/>
+        <a:font script="Deva" typeface="Mangal"/>
+        <a:font script="Telu" typeface="Gautami"/>
+        <a:font script="Taml" typeface="Latha"/>
+        <a:font script="Syrc" typeface="Estrangelo Edessa"/>
+        <a:font script="Orya" typeface="Kalinga"/>
+        <a:font script="Mlym" typeface="Kartika"/>
+        <a:font script="Laoo" typeface="DokChampa"/>
+        <a:font script="Sinh" typeface="Iskoola Pota"/>
+        <a:font script="Mong" typeface="Mongolian Baiti"/>
+        <a:font script="Viet" typeface="Times New Roman"/>
+        <a:font script="Uigh" typeface="Microsoft Uighur"/>
+        <a:font script="Geor" typeface="Sylfaen"/>
+        <a:font script="Armn" typeface="Arial"/>
+        <a:font script="Bugi" typeface="Leelawadee UI"/>
+        <a:font script="Bopo" typeface="Microsoft JhengHei"/>
+        <a:font script="Java" typeface="Javanese Text"/>
+        <a:font script="Lisu" typeface="Segoe UI"/>
+        <a:font script="Mymr" typeface="Myanmar Text"/>
+        <a:font script="Nkoo" typeface="Ebrima"/>
+        <a:font script="Olck" typeface="Nirmala UI"/>
+        <a:font script="Osma" typeface="Ebrima"/>
+        <a:font script="Phag" typeface="Phagspa"/>
+        <a:font script="Syrn" typeface="Estrangelo Edessa"/>
+        <a:font script="Syrj" typeface="Estrangelo Edessa"/>
+        <a:font script="Syre" typeface="Estrangelo Edessa"/>
+        <a:font script="Sora" typeface="Nirmala UI"/>
+        <a:font script="Tale" typeface="Microsoft Tai Le"/>
+        <a:font script="Talu" typeface="Microsoft New Tai Lue"/>
+        <a:font script="Tfng" typeface="Ebrima"/>
+      </a:majorFont>
+      <a:minorFont>
+        <a:latin typeface="Calibri" panose="020F0502020204030204"/>
+        <a:ea typeface=""/>
+        <a:cs typeface=""/>
+        <a:font script="Jpan" typeface="游ゴシック"/>
+        <a:font script="Hang" typeface="맑은 고딕"/>
+        <a:font script="Hans" typeface="等线"/>
+        <a:font script="Hant" typeface="新細明體"/>
+        <a:font script="Arab" typeface="Arial"/>
+        <a:font script="Hebr" typeface="Arial"/>
+        <a:font script="Thai" typeface="Cordia New"/>
+        <a:font script="Ethi" typeface="Nyala"/>
+        <a:font script="Beng" typeface="Vrinda"/>
+        <a:font script="Gujr" typeface="Shruti"/>
+        <a:font script="Khmr" typeface="DaunPenh"/>
+        <a:font script="Knda" typeface="Tunga"/>
+        <a:font script="Guru" typeface="Raavi"/>
+        <a:font script="Cans" typeface="Euphemia"/>
+        <a:font script="Cher" typeface="Plantagenet Cherokee"/>
+        <a:font script="Yiii" typeface="Microsoft Yi Baiti"/>
+        <a:font script="Tibt" typeface="Microsoft Himalaya"/>
+        <a:font script="Thaa" typeface="MV Boli"/>
+        <a:font script="Deva" typeface="Mangal"/>
+        <a:font script="Telu" typeface="Gautami"/>
+        <a:font script="Taml" typeface="Latha"/>
+        <a:font script="Syrc" typeface="Estrangelo Edessa"/>
+        <a:font script="Orya" typeface="Kalinga"/>
+        <a:font script="Mlym" typeface="Kartika"/>
+        <a:font script="Laoo" typeface="DokChampa"/>
+        <a:font script="Sinh" typeface="Iskoola Pota"/>
+        <a:font script="Mong" typeface="Mongolian Baiti"/>
+        <a:font script="Viet" typeface="Arial"/>
+        <a:font script="Uigh" typeface="Microsoft Uighur"/>
+        <a:font script="Geor" typeface="Sylfaen"/>
+        <a:font script="Armn" typeface="Arial"/>
+        <a:font script="Bugi" typeface="Leelawadee UI"/>
+        <a:font script="Bopo" typeface="Microsoft JhengHei"/>
+        <a:font script="Java" typeface="Javanese Text"/>
+        <a:font script="Lisu" typeface="Segoe UI"/>
+        <a:font script="Mymr" typeface="Myanmar Text"/>
+        <a:font script="Nkoo" typeface="Ebrima"/>
+        <a:font script="Olck" typeface="Nirmala UI"/>
+        <a:font script="Osma" typeface="Ebrima"/>
+        <a:font script="Phag" typeface="Phagspa"/>
+        <a:font script="Syrn" typeface="Estrangelo Edessa"/>
+        <a:font script="Syrj" typeface="Estrangelo Edessa"/>
+        <a:font script="Syre" typeface="Estrangelo Edessa"/>
+        <a:font script="Sora" typeface="Nirmala UI"/>
+        <a:font script="Tale" typeface="Microsoft Tai Le"/>
+        <a:font script="Talu" typeface="Microsoft New Tai Lue"/>
+        <a:font script="Tfng" typeface="Ebrima"/>
+      </a:minorFont>
+    </a:fontScheme>
+    <a:fmtScheme name="Office">
+      <a:fillStyleLst>
+        <a:solidFill>
+          <a:schemeClr val="phClr"/>
+        </a:solidFill>
+        <a:gradFill rotWithShape="1">
+          <a:gsLst>
+            <a:gs pos="0">
+              <a:schemeClr val="phClr">
+                <a:lumMod val="110000"/>
+                <a:satMod val="105000"/>
+                <a:tint val="67000"/>
+              </a:schemeClr>
+            </a:gs>
+            <a:gs pos="50000">
+              <a:schemeClr val="phClr">
+                <a:lumMod val="105000"/>
+                <a:satMod val="103000"/>
+                <a:tint val="73000"/>
+              </a:schemeClr>
+            </a:gs>
+            <a:gs pos="100000">
+              <a:schemeClr val="phClr">
+                <a:lumMod val="105000"/>
+                <a:satMod val="109000"/>
+                <a:tint val="81000"/>
+              </a:schemeClr>
+            </a:gs>
+          </a:gsLst>
+          <a:lin ang="5400000" scaled="0"/>
+        </a:gradFill>
+        <a:gradFill rotWithShape="1">
+          <a:gsLst>
+            <a:gs pos="0">
+              <a:schemeClr val="phClr">
+                <a:satMod val="103000"/>
+                <a:lumMod val="102000"/>
+                <a:tint val="94000"/>
+              </a:schemeClr>
+            </a:gs>
+            <a:gs pos="50000">
+              <a:schemeClr val="phClr">
+                <a:satMod val="110000"/>
+                <a:lumMod val="100000"/>
+                <a:shade val="100000"/>
+              </a:schemeClr>
+            </a:gs>
+            <a:gs pos="100000">
+              <a:schemeClr val="phClr">
+                <a:lumMod val="99000"/>
+                <a:satMod val="120000"/>
+                <a:shade val="78000"/>
+              </a:schemeClr>
+            </a:gs>
+          </a:gsLst>
+          <a:lin ang="5400000" scaled="0"/>
+        </a:gradFill>
+      </a:fillStyleLst>
+      <a:lnStyleLst>
+        <a:ln w="6350" cap="flat" cmpd="sng" algn="ctr">
+          <a:solidFill>
+            <a:schemeClr val="phClr"/>
+          </a:solidFill>
+          <a:prstDash val="solid"/>
+          <a:miter lim="800000"/>
+        </a:ln>
+        <a:ln w="12700" cap="flat" cmpd="sng" algn="ctr">
+          <a:solidFill>
+            <a:schemeClr val="phClr"/>
+          </a:solidFill>
+          <a:prstDash val="solid"/>
+          <a:miter lim="800000"/>
+        </a:ln>
+        <a:ln w="19050" cap="flat" cmpd="sng" algn="ctr">
+          <a:solidFill>
+            <a:schemeClr val="phClr"/>
+          </a:solidFill>
+          <a:prstDash val="solid"/>
+          <a:miter lim="800000"/>
+        </a:ln>
+      </a:lnStyleLst>
+      <a:effectStyleLst>
+        <a:effectStyle>
+          <a:effectLst/>
+        </a:effectStyle>
+        <a:effectStyle>
+          <a:effectLst/>
+        </a:effectStyle>
+        <a:effectStyle>
+          <a:effectLst>
+            <a:outerShdw blurRad="57150" dist="19050" dir="5400000" algn="ctr" rotWithShape="0">
+              <a:srgbClr val="000000">
+                <a:alpha val="63000"/>
+              </a:srgbClr>
+            </a:outerShdw>
+          </a:effectLst>
+        </a:effectStyle>
+      </a:effectStyleLst>
+      <a:bgFillStyleLst>
+        <a:solidFill>
+          <a:schemeClr val="phClr"/>
+        </a:solidFill>
+        <a:solidFill>
+          <a:schemeClr val="phClr">
+            <a:tint val="95000"/>
+            <a:satMod val="170000"/>
+          </a:schemeClr>
+        </a:solidFill>
+        <a:gradFill rotWithShape="1">
+          <a:gsLst>
+            <a:gs pos="0">
+              <a:schemeClr val="phClr">
+                <a:tint val="93000"/>
+                <a:satMod val="150000"/>
+                <a:shade val="98000"/>
+                <a:lumMod val="102000"/>
+              </a:schemeClr>
+            </a:gs>
+            <a:gs pos="50000">
+              <a:schemeClr val="phClr">
+                <a:tint val="98000"/>
+                <a:satMod val="130000"/>
+                <a:shade val="90000"/>
+                <a:lumMod val="103000"/>
+              </a:schemeClr>
+            </a:gs>
+            <a:gs pos="100000">
+              <a:schemeClr val="phClr">
+                <a:shade val="63000"/>
+                <a:satMod val="120000"/>
+              </a:schemeClr>
+            </a:gs>
+          </a:gsLst>
+          <a:lin ang="5400000" scaled="0"/>
+        </a:gradFill>
+      </a:bgFillStyleLst>
+    </a:fmtScheme>
+  </a:themeElements>
+  <a:objectDefaults/>
+  <a:extraClrSchemeLst/>
+  <a:extLst>
+    <a:ext uri="{05A4C25C-085E-4340-85A3-A5531E510DB2}">
+      <thm15:themeFamily xmlns:thm15="http://schemas.microsoft.com/office/thememl/2012/main" name="Office Theme" id="{62F939B6-93AF-4DB8-9C6B-D6C7DFDC589F}" vid="{4A3C46E8-61CC-4603-A589-7422A47A8E4A}"/>
+    </a:ext>
+  </a:extLst>
+</a:theme>
 </file>
</xml_diff>